<commit_message>
adding datalad button to workflow
</commit_message>
<xml_diff>
--- a/docs/_static/Timeline_Finalized_Linked.pptx
+++ b/docs/_static/Timeline_Finalized_Linked.pptx
@@ -197,7 +197,7 @@
           <a:p>
             <a:fld id="{FB874BE1-A17F-6B49-9219-89EA812F27EA}" type="datetimeFigureOut">
               <a:rPr lang="en-US" smtClean="0"/>
-              <a:t>5/23/20</a:t>
+              <a:t>9/10/20</a:t>
             </a:fld>
             <a:endParaRPr lang="en-US"/>
           </a:p>
@@ -684,7 +684,7 @@
           <a:p>
             <a:fld id="{54235F48-D939-424A-B563-AE881225AA62}" type="datetimeFigureOut">
               <a:rPr lang="en-US" smtClean="0"/>
-              <a:t>5/23/20</a:t>
+              <a:t>9/10/20</a:t>
             </a:fld>
             <a:endParaRPr lang="en-US"/>
           </a:p>
@@ -854,7 +854,7 @@
           <a:p>
             <a:fld id="{54235F48-D939-424A-B563-AE881225AA62}" type="datetimeFigureOut">
               <a:rPr lang="en-US" smtClean="0"/>
-              <a:t>5/23/20</a:t>
+              <a:t>9/10/20</a:t>
             </a:fld>
             <a:endParaRPr lang="en-US"/>
           </a:p>
@@ -1034,7 +1034,7 @@
           <a:p>
             <a:fld id="{54235F48-D939-424A-B563-AE881225AA62}" type="datetimeFigureOut">
               <a:rPr lang="en-US" smtClean="0"/>
-              <a:t>5/23/20</a:t>
+              <a:t>9/10/20</a:t>
             </a:fld>
             <a:endParaRPr lang="en-US"/>
           </a:p>
@@ -1204,7 +1204,7 @@
           <a:p>
             <a:fld id="{54235F48-D939-424A-B563-AE881225AA62}" type="datetimeFigureOut">
               <a:rPr lang="en-US" smtClean="0"/>
-              <a:t>5/23/20</a:t>
+              <a:t>9/10/20</a:t>
             </a:fld>
             <a:endParaRPr lang="en-US"/>
           </a:p>
@@ -1448,7 +1448,7 @@
           <a:p>
             <a:fld id="{54235F48-D939-424A-B563-AE881225AA62}" type="datetimeFigureOut">
               <a:rPr lang="en-US" smtClean="0"/>
-              <a:t>5/23/20</a:t>
+              <a:t>9/10/20</a:t>
             </a:fld>
             <a:endParaRPr lang="en-US"/>
           </a:p>
@@ -1680,7 +1680,7 @@
           <a:p>
             <a:fld id="{54235F48-D939-424A-B563-AE881225AA62}" type="datetimeFigureOut">
               <a:rPr lang="en-US" smtClean="0"/>
-              <a:t>5/23/20</a:t>
+              <a:t>9/10/20</a:t>
             </a:fld>
             <a:endParaRPr lang="en-US"/>
           </a:p>
@@ -2047,7 +2047,7 @@
           <a:p>
             <a:fld id="{54235F48-D939-424A-B563-AE881225AA62}" type="datetimeFigureOut">
               <a:rPr lang="en-US" smtClean="0"/>
-              <a:t>5/23/20</a:t>
+              <a:t>9/10/20</a:t>
             </a:fld>
             <a:endParaRPr lang="en-US"/>
           </a:p>
@@ -2165,7 +2165,7 @@
           <a:p>
             <a:fld id="{54235F48-D939-424A-B563-AE881225AA62}" type="datetimeFigureOut">
               <a:rPr lang="en-US" smtClean="0"/>
-              <a:t>5/23/20</a:t>
+              <a:t>9/10/20</a:t>
             </a:fld>
             <a:endParaRPr lang="en-US"/>
           </a:p>
@@ -2260,7 +2260,7 @@
           <a:p>
             <a:fld id="{54235F48-D939-424A-B563-AE881225AA62}" type="datetimeFigureOut">
               <a:rPr lang="en-US" smtClean="0"/>
-              <a:t>5/23/20</a:t>
+              <a:t>9/10/20</a:t>
             </a:fld>
             <a:endParaRPr lang="en-US"/>
           </a:p>
@@ -2537,7 +2537,7 @@
           <a:p>
             <a:fld id="{54235F48-D939-424A-B563-AE881225AA62}" type="datetimeFigureOut">
               <a:rPr lang="en-US" smtClean="0"/>
-              <a:t>5/23/20</a:t>
+              <a:t>9/10/20</a:t>
             </a:fld>
             <a:endParaRPr lang="en-US"/>
           </a:p>
@@ -2794,7 +2794,7 @@
           <a:p>
             <a:fld id="{54235F48-D939-424A-B563-AE881225AA62}" type="datetimeFigureOut">
               <a:rPr lang="en-US" smtClean="0"/>
-              <a:t>5/23/20</a:t>
+              <a:t>9/10/20</a:t>
             </a:fld>
             <a:endParaRPr lang="en-US"/>
           </a:p>
@@ -3007,7 +3007,7 @@
           <a:p>
             <a:fld id="{54235F48-D939-424A-B563-AE881225AA62}" type="datetimeFigureOut">
               <a:rPr lang="en-US" smtClean="0"/>
-              <a:t>5/23/20</a:t>
+              <a:t>9/10/20</a:t>
             </a:fld>
             <a:endParaRPr lang="en-US"/>
           </a:p>
@@ -4582,7 +4582,7 @@
                 </a:solidFill>
                 <a:ea typeface="Calibri" panose="020F0502020204030204" pitchFamily="34" charset="0"/>
                 <a:cs typeface="Times New Roman (Body CS)"/>
-                <a:hlinkClick r:id="rId3">
+                <a:hlinkClick r:id="rId4">
                   <a:extLst>
                     <a:ext uri="{A12FA001-AC4F-418D-AE19-62706E023703}">
                       <ahyp:hlinkClr xmlns:ahyp="http://schemas.microsoft.com/office/drawing/2018/hyperlinkcolor" val="tx"/>
@@ -4605,7 +4605,7 @@
       <p:sp>
         <p:nvSpPr>
           <p:cNvPr id="15" name="Rounded Rectangle 14">
-            <a:hlinkClick r:id="rId4"/>
+            <a:hlinkClick r:id="rId5"/>
             <a:extLst>
               <a:ext uri="{FF2B5EF4-FFF2-40B4-BE49-F238E27FC236}">
                 <a16:creationId xmlns:a16="http://schemas.microsoft.com/office/drawing/2014/main" id="{6445E7F9-C63C-0D4E-AC02-7CAFAF240540}"/>
@@ -4686,7 +4686,7 @@
                 </a:solidFill>
                 <a:ea typeface="Calibri" panose="020F0502020204030204" pitchFamily="34" charset="0"/>
                 <a:cs typeface="Times New Roman (Body CS)"/>
-                <a:hlinkClick r:id="rId4">
+                <a:hlinkClick r:id="rId6">
                   <a:extLst>
                     <a:ext uri="{A12FA001-AC4F-418D-AE19-62706E023703}">
                       <ahyp:hlinkClr xmlns:ahyp="http://schemas.microsoft.com/office/drawing/2018/hyperlinkcolor" val="tx"/>
@@ -5199,7 +5199,7 @@
       <p:sp>
         <p:nvSpPr>
           <p:cNvPr id="34" name="Rounded Rectangle 33">
-            <a:hlinkClick r:id="rId4"/>
+            <a:hlinkClick r:id="rId5"/>
             <a:extLst>
               <a:ext uri="{FF2B5EF4-FFF2-40B4-BE49-F238E27FC236}">
                 <a16:creationId xmlns:a16="http://schemas.microsoft.com/office/drawing/2014/main" id="{5630FB77-FDCE-0343-B816-FF9E25DDF5D9}"/>
@@ -5280,7 +5280,7 @@
                 </a:solidFill>
                 <a:ea typeface="Calibri" panose="020F0502020204030204" pitchFamily="34" charset="0"/>
                 <a:cs typeface="Times New Roman (Body CS)"/>
-                <a:hlinkClick r:id="rId4">
+                <a:hlinkClick r:id="rId6">
                   <a:extLst>
                     <a:ext uri="{A12FA001-AC4F-418D-AE19-62706E023703}">
                       <ahyp:hlinkClr xmlns:ahyp="http://schemas.microsoft.com/office/drawing/2018/hyperlinkcolor" val="tx"/>
@@ -6065,7 +6065,7 @@
       <p:sp>
         <p:nvSpPr>
           <p:cNvPr id="52" name="Rounded Rectangle 51">
-            <a:hlinkClick r:id="rId5"/>
+            <a:hlinkClick r:id="rId7"/>
             <a:extLst>
               <a:ext uri="{FF2B5EF4-FFF2-40B4-BE49-F238E27FC236}">
                 <a16:creationId xmlns:a16="http://schemas.microsoft.com/office/drawing/2014/main" id="{8F8B14DD-5B82-9547-8B90-9D528B21299B}"/>
@@ -6150,7 +6150,7 @@
                 </a:solidFill>
                 <a:ea typeface="Calibri" panose="020F0502020204030204" pitchFamily="34" charset="0"/>
                 <a:cs typeface="Times New Roman (Body CS)"/>
-                <a:hlinkClick r:id="rId5">
+                <a:hlinkClick r:id="rId7">
                   <a:extLst>
                     <a:ext uri="{A12FA001-AC4F-418D-AE19-62706E023703}">
                       <ahyp:hlinkClr xmlns:ahyp="http://schemas.microsoft.com/office/drawing/2018/hyperlinkcolor" val="tx"/>
@@ -6273,7 +6273,7 @@
       <p:sp>
         <p:nvSpPr>
           <p:cNvPr id="54" name="Rounded Rectangle 53">
-            <a:hlinkClick r:id="rId6"/>
+            <a:hlinkClick r:id="rId8"/>
             <a:extLst>
               <a:ext uri="{FF2B5EF4-FFF2-40B4-BE49-F238E27FC236}">
                 <a16:creationId xmlns:a16="http://schemas.microsoft.com/office/drawing/2014/main" id="{8DF4BEE3-0C9E-844D-BBA5-7D15B696D91F}"/>
@@ -6358,7 +6358,7 @@
                 </a:solidFill>
                 <a:ea typeface="Calibri" panose="020F0502020204030204" pitchFamily="34" charset="0"/>
                 <a:cs typeface="Times New Roman (Body CS)"/>
-                <a:hlinkClick r:id="rId6">
+                <a:hlinkClick r:id="rId8">
                   <a:extLst>
                     <a:ext uri="{A12FA001-AC4F-418D-AE19-62706E023703}">
                       <ahyp:hlinkClr xmlns:ahyp="http://schemas.microsoft.com/office/drawing/2018/hyperlinkcolor" val="tx"/>
@@ -6381,7 +6381,7 @@
       <p:sp>
         <p:nvSpPr>
           <p:cNvPr id="57" name="Rounded Rectangle 56">
-            <a:hlinkClick r:id="rId7"/>
+            <a:hlinkClick r:id="rId9"/>
             <a:extLst>
               <a:ext uri="{FF2B5EF4-FFF2-40B4-BE49-F238E27FC236}">
                 <a16:creationId xmlns:a16="http://schemas.microsoft.com/office/drawing/2014/main" id="{130B27E3-54A0-F444-856F-95E54674E36B}"/>
@@ -6462,7 +6462,7 @@
                 </a:solidFill>
                 <a:ea typeface="Calibri" panose="020F0502020204030204" pitchFamily="34" charset="0"/>
                 <a:cs typeface="Times New Roman (Body CS)"/>
-                <a:hlinkClick r:id="rId7">
+                <a:hlinkClick r:id="rId9">
                   <a:extLst>
                     <a:ext uri="{A12FA001-AC4F-418D-AE19-62706E023703}">
                       <ahyp:hlinkClr xmlns:ahyp="http://schemas.microsoft.com/office/drawing/2018/hyperlinkcolor" val="tx"/>
@@ -6485,7 +6485,7 @@
       <p:sp>
         <p:nvSpPr>
           <p:cNvPr id="58" name="Rounded Rectangle 57">
-            <a:hlinkClick r:id="rId8"/>
+            <a:hlinkClick r:id="rId10"/>
             <a:extLst>
               <a:ext uri="{FF2B5EF4-FFF2-40B4-BE49-F238E27FC236}">
                 <a16:creationId xmlns:a16="http://schemas.microsoft.com/office/drawing/2014/main" id="{98DBCBB0-7F93-D248-ABE4-670F9CE80FD3}"/>
@@ -6570,7 +6570,7 @@
                 </a:solidFill>
                 <a:ea typeface="Calibri" panose="020F0502020204030204" pitchFamily="34" charset="0"/>
                 <a:cs typeface="Times New Roman (Body CS)"/>
-                <a:hlinkClick r:id="rId8">
+                <a:hlinkClick r:id="rId10">
                   <a:extLst>
                     <a:ext uri="{A12FA001-AC4F-418D-AE19-62706E023703}">
                       <ahyp:hlinkClr xmlns:ahyp="http://schemas.microsoft.com/office/drawing/2018/hyperlinkcolor" val="tx"/>
@@ -6593,7 +6593,7 @@
       <p:sp>
         <p:nvSpPr>
           <p:cNvPr id="63" name="Rounded Rectangle 62">
-            <a:hlinkClick r:id="rId9"/>
+            <a:hlinkClick r:id="rId11"/>
             <a:extLst>
               <a:ext uri="{FF2B5EF4-FFF2-40B4-BE49-F238E27FC236}">
                 <a16:creationId xmlns:a16="http://schemas.microsoft.com/office/drawing/2014/main" id="{4382A558-D8EB-D14F-9884-259A47BF19F7}"/>
@@ -6674,7 +6674,7 @@
                 </a:solidFill>
                 <a:ea typeface="Calibri" panose="020F0502020204030204" pitchFamily="34" charset="0"/>
                 <a:cs typeface="Times New Roman (Body CS)"/>
-                <a:hlinkClick r:id="rId9">
+                <a:hlinkClick r:id="rId11">
                   <a:extLst>
                     <a:ext uri="{A12FA001-AC4F-418D-AE19-62706E023703}">
                       <ahyp:hlinkClr xmlns:ahyp="http://schemas.microsoft.com/office/drawing/2018/hyperlinkcolor" val="tx"/>
@@ -6840,7 +6840,7 @@
       <p:sp>
         <p:nvSpPr>
           <p:cNvPr id="66" name="Rounded Rectangle 65">
-            <a:hlinkClick r:id="rId10"/>
+            <a:hlinkClick r:id="rId12"/>
             <a:extLst>
               <a:ext uri="{FF2B5EF4-FFF2-40B4-BE49-F238E27FC236}">
                 <a16:creationId xmlns:a16="http://schemas.microsoft.com/office/drawing/2014/main" id="{23EA373B-A672-8D46-B9D2-FEFBFBF10314}"/>
@@ -6852,8 +6852,8 @@
         </p:nvSpPr>
         <p:spPr>
           <a:xfrm>
-            <a:off x="1302024" y="12004869"/>
-            <a:ext cx="1480820" cy="673735"/>
+            <a:off x="1247844" y="12005628"/>
+            <a:ext cx="1151192" cy="673735"/>
           </a:xfrm>
           <a:prstGeom prst="roundRect">
             <a:avLst/>
@@ -6919,7 +6919,7 @@
                 </a:solidFill>
                 <a:ea typeface="Calibri" panose="020F0502020204030204" pitchFamily="34" charset="0"/>
                 <a:cs typeface="Times New Roman" panose="02020603050405020304" pitchFamily="18" charset="0"/>
-                <a:hlinkClick r:id="rId10">
+                <a:hlinkClick r:id="rId13">
                   <a:extLst>
                     <a:ext uri="{A12FA001-AC4F-418D-AE19-62706E023703}">
                       <ahyp:hlinkClr xmlns:ahyp="http://schemas.microsoft.com/office/drawing/2018/hyperlinkcolor" val="tx"/>
@@ -6942,7 +6942,7 @@
       <p:sp>
         <p:nvSpPr>
           <p:cNvPr id="67" name="Rounded Rectangle 66">
-            <a:hlinkClick r:id="rId11"/>
+            <a:hlinkClick r:id="rId14"/>
             <a:extLst>
               <a:ext uri="{FF2B5EF4-FFF2-40B4-BE49-F238E27FC236}">
                 <a16:creationId xmlns:a16="http://schemas.microsoft.com/office/drawing/2014/main" id="{B3FB1FE2-96B9-1E40-8274-A017814B3DD9}"/>
@@ -6954,8 +6954,8 @@
         </p:nvSpPr>
         <p:spPr>
           <a:xfrm>
-            <a:off x="2969142" y="12004869"/>
-            <a:ext cx="2001373" cy="673735"/>
+            <a:off x="3857556" y="12005628"/>
+            <a:ext cx="1974268" cy="673735"/>
           </a:xfrm>
           <a:prstGeom prst="roundRect">
             <a:avLst/>
@@ -7021,7 +7021,7 @@
                 </a:solidFill>
                 <a:ea typeface="Calibri" panose="020F0502020204030204" pitchFamily="34" charset="0"/>
                 <a:cs typeface="Times New Roman" panose="02020603050405020304" pitchFamily="18" charset="0"/>
-                <a:hlinkClick r:id="rId11">
+                <a:hlinkClick r:id="rId14">
                   <a:extLst>
                     <a:ext uri="{A12FA001-AC4F-418D-AE19-62706E023703}">
                       <ahyp:hlinkClr xmlns:ahyp="http://schemas.microsoft.com/office/drawing/2018/hyperlinkcolor" val="tx"/>
@@ -7125,7 +7125,7 @@
       <p:sp>
         <p:nvSpPr>
           <p:cNvPr id="69" name="Rounded Rectangle 68">
-            <a:hlinkClick r:id="rId12"/>
+            <a:hlinkClick r:id="rId15"/>
             <a:extLst>
               <a:ext uri="{FF2B5EF4-FFF2-40B4-BE49-F238E27FC236}">
                 <a16:creationId xmlns:a16="http://schemas.microsoft.com/office/drawing/2014/main" id="{FAC11A01-3E34-5544-9C85-62B46194F0FA}"/>
@@ -7137,8 +7137,8 @@
         </p:nvSpPr>
         <p:spPr>
           <a:xfrm>
-            <a:off x="5143940" y="11998590"/>
-            <a:ext cx="2481465" cy="673735"/>
+            <a:off x="5931462" y="11996034"/>
+            <a:ext cx="2334706" cy="673735"/>
           </a:xfrm>
           <a:prstGeom prst="roundRect">
             <a:avLst/>
@@ -7204,7 +7204,7 @@
                 </a:solidFill>
                 <a:ea typeface="Calibri" panose="020F0502020204030204" pitchFamily="34" charset="0"/>
                 <a:cs typeface="Times New Roman" panose="02020603050405020304" pitchFamily="18" charset="0"/>
-                <a:hlinkClick r:id="rId12">
+                <a:hlinkClick r:id="rId15">
                   <a:extLst>
                     <a:ext uri="{A12FA001-AC4F-418D-AE19-62706E023703}">
                       <ahyp:hlinkClr xmlns:ahyp="http://schemas.microsoft.com/office/drawing/2018/hyperlinkcolor" val="tx"/>
@@ -7227,7 +7227,7 @@
       <p:sp>
         <p:nvSpPr>
           <p:cNvPr id="70" name="Rounded Rectangle 69">
-            <a:hlinkClick r:id="rId13"/>
+            <a:hlinkClick r:id="rId16"/>
             <a:extLst>
               <a:ext uri="{FF2B5EF4-FFF2-40B4-BE49-F238E27FC236}">
                 <a16:creationId xmlns:a16="http://schemas.microsoft.com/office/drawing/2014/main" id="{5C38F2D3-6237-DA43-AC12-2BEBD8215185}"/>
@@ -7239,8 +7239,8 @@
         </p:nvSpPr>
         <p:spPr>
           <a:xfrm>
-            <a:off x="7794080" y="11987284"/>
-            <a:ext cx="1480820" cy="673735"/>
+            <a:off x="8380736" y="11998284"/>
+            <a:ext cx="1161508" cy="673735"/>
           </a:xfrm>
           <a:prstGeom prst="roundRect">
             <a:avLst/>
@@ -7306,7 +7306,7 @@
                 </a:solidFill>
                 <a:ea typeface="Calibri" panose="020F0502020204030204" pitchFamily="34" charset="0"/>
                 <a:cs typeface="Times New Roman" panose="02020603050405020304" pitchFamily="18" charset="0"/>
-                <a:hlinkClick r:id="rId13">
+                <a:hlinkClick r:id="rId16">
                   <a:extLst>
                     <a:ext uri="{A12FA001-AC4F-418D-AE19-62706E023703}">
                       <ahyp:hlinkClr xmlns:ahyp="http://schemas.microsoft.com/office/drawing/2018/hyperlinkcolor" val="tx"/>
@@ -7329,7 +7329,7 @@
       <p:sp>
         <p:nvSpPr>
           <p:cNvPr id="71" name="Rounded Rectangle 70">
-            <a:hlinkClick r:id="rId14"/>
+            <a:hlinkClick r:id="rId17"/>
             <a:extLst>
               <a:ext uri="{FF2B5EF4-FFF2-40B4-BE49-F238E27FC236}">
                 <a16:creationId xmlns:a16="http://schemas.microsoft.com/office/drawing/2014/main" id="{FEB7B85A-DEFF-D94C-90D6-ABC39142A66B}"/>
@@ -7341,8 +7341,8 @@
         </p:nvSpPr>
         <p:spPr>
           <a:xfrm>
-            <a:off x="9407982" y="11979165"/>
-            <a:ext cx="1480820" cy="673735"/>
+            <a:off x="9659728" y="11980206"/>
+            <a:ext cx="1347237" cy="673735"/>
           </a:xfrm>
           <a:prstGeom prst="roundRect">
             <a:avLst/>
@@ -7408,7 +7408,7 @@
                 </a:solidFill>
                 <a:ea typeface="Calibri" panose="020F0502020204030204" pitchFamily="34" charset="0"/>
                 <a:cs typeface="Times New Roman" panose="02020603050405020304" pitchFamily="18" charset="0"/>
-                <a:hlinkClick r:id="rId14">
+                <a:hlinkClick r:id="rId17">
                   <a:extLst>
                     <a:ext uri="{A12FA001-AC4F-418D-AE19-62706E023703}">
                       <ahyp:hlinkClr xmlns:ahyp="http://schemas.microsoft.com/office/drawing/2018/hyperlinkcolor" val="tx"/>
@@ -7635,7 +7635,7 @@
       <p:sp>
         <p:nvSpPr>
           <p:cNvPr id="93" name="Rounded Rectangle 92">
-            <a:hlinkClick r:id="rId15"/>
+            <a:hlinkClick r:id="rId18"/>
             <a:extLst>
               <a:ext uri="{FF2B5EF4-FFF2-40B4-BE49-F238E27FC236}">
                 <a16:creationId xmlns:a16="http://schemas.microsoft.com/office/drawing/2014/main" id="{827F4B31-7E46-224A-8922-B86E87040F91}"/>
@@ -7714,7 +7714,7 @@
                 </a:solidFill>
                 <a:ea typeface="Calibri" panose="020F0502020204030204" pitchFamily="34" charset="0"/>
                 <a:cs typeface="Times New Roman" panose="02020603050405020304" pitchFamily="18" charset="0"/>
-                <a:hlinkClick r:id="rId15">
+                <a:hlinkClick r:id="rId18">
                   <a:extLst>
                     <a:ext uri="{A12FA001-AC4F-418D-AE19-62706E023703}">
                       <ahyp:hlinkClr xmlns:ahyp="http://schemas.microsoft.com/office/drawing/2018/hyperlinkcolor" val="tx"/>
@@ -7731,7 +7731,7 @@
                 </a:solidFill>
                 <a:ea typeface="Calibri" panose="020F0502020204030204" pitchFamily="34" charset="0"/>
                 <a:cs typeface="Times New Roman" panose="02020603050405020304" pitchFamily="18" charset="0"/>
-                <a:hlinkClick r:id="rId15">
+                <a:hlinkClick r:id="rId18">
                   <a:extLst>
                     <a:ext uri="{A12FA001-AC4F-418D-AE19-62706E023703}">
                       <ahyp:hlinkClr xmlns:ahyp="http://schemas.microsoft.com/office/drawing/2018/hyperlinkcolor" val="tx"/>
@@ -7748,7 +7748,7 @@
                 </a:solidFill>
                 <a:ea typeface="Calibri" panose="020F0502020204030204" pitchFamily="34" charset="0"/>
                 <a:cs typeface="Times New Roman" panose="02020603050405020304" pitchFamily="18" charset="0"/>
-                <a:hlinkClick r:id="rId15">
+                <a:hlinkClick r:id="rId18">
                   <a:extLst>
                     <a:ext uri="{A12FA001-AC4F-418D-AE19-62706E023703}">
                       <ahyp:hlinkClr xmlns:ahyp="http://schemas.microsoft.com/office/drawing/2018/hyperlinkcolor" val="tx"/>
@@ -7979,7 +7979,7 @@
       <p:sp>
         <p:nvSpPr>
           <p:cNvPr id="98" name="Rounded Rectangle 97">
-            <a:hlinkClick r:id="rId16"/>
+            <a:hlinkClick r:id="rId19"/>
             <a:extLst>
               <a:ext uri="{FF2B5EF4-FFF2-40B4-BE49-F238E27FC236}">
                 <a16:creationId xmlns:a16="http://schemas.microsoft.com/office/drawing/2014/main" id="{0D6F03FA-B07D-D347-B952-71B5378F3242}"/>
@@ -8058,7 +8058,7 @@
                 </a:solidFill>
                 <a:ea typeface="Calibri" panose="020F0502020204030204" pitchFamily="34" charset="0"/>
                 <a:cs typeface="Times New Roman" panose="02020603050405020304" pitchFamily="18" charset="0"/>
-                <a:hlinkClick r:id="rId16">
+                <a:hlinkClick r:id="rId19">
                   <a:extLst>
                     <a:ext uri="{A12FA001-AC4F-418D-AE19-62706E023703}">
                       <ahyp:hlinkClr xmlns:ahyp="http://schemas.microsoft.com/office/drawing/2018/hyperlinkcolor" val="tx"/>
@@ -8078,7 +8078,7 @@
                 </a:solidFill>
                 <a:ea typeface="Calibri" panose="020F0502020204030204" pitchFamily="34" charset="0"/>
                 <a:cs typeface="Times New Roman" panose="02020603050405020304" pitchFamily="18" charset="0"/>
-                <a:hlinkClick r:id="rId16">
+                <a:hlinkClick r:id="rId19">
                   <a:extLst>
                     <a:ext uri="{A12FA001-AC4F-418D-AE19-62706E023703}">
                       <ahyp:hlinkClr xmlns:ahyp="http://schemas.microsoft.com/office/drawing/2018/hyperlinkcolor" val="tx"/>
@@ -8095,7 +8095,7 @@
                 </a:solidFill>
                 <a:ea typeface="Calibri" panose="020F0502020204030204" pitchFamily="34" charset="0"/>
                 <a:cs typeface="Times New Roman" panose="02020603050405020304" pitchFamily="18" charset="0"/>
-                <a:hlinkClick r:id="rId16">
+                <a:hlinkClick r:id="rId19">
                   <a:extLst>
                     <a:ext uri="{A12FA001-AC4F-418D-AE19-62706E023703}">
                       <ahyp:hlinkClr xmlns:ahyp="http://schemas.microsoft.com/office/drawing/2018/hyperlinkcolor" val="tx"/>
@@ -8112,7 +8112,7 @@
                 </a:solidFill>
                 <a:ea typeface="Calibri" panose="020F0502020204030204" pitchFamily="34" charset="0"/>
                 <a:cs typeface="Times New Roman" panose="02020603050405020304" pitchFamily="18" charset="0"/>
-                <a:hlinkClick r:id="rId16">
+                <a:hlinkClick r:id="rId19">
                   <a:extLst>
                     <a:ext uri="{A12FA001-AC4F-418D-AE19-62706E023703}">
                       <ahyp:hlinkClr xmlns:ahyp="http://schemas.microsoft.com/office/drawing/2018/hyperlinkcolor" val="tx"/>
@@ -8714,7 +8714,7 @@
       <p:sp>
         <p:nvSpPr>
           <p:cNvPr id="128" name="Rounded Rectangle 127">
-            <a:hlinkClick r:id="rId17"/>
+            <a:hlinkClick r:id="rId20"/>
             <a:extLst>
               <a:ext uri="{FF2B5EF4-FFF2-40B4-BE49-F238E27FC236}">
                 <a16:creationId xmlns:a16="http://schemas.microsoft.com/office/drawing/2014/main" id="{90D1B34F-24C9-6B40-9680-06F8F7ADCD3E}"/>
@@ -8802,7 +8802,7 @@
                 </a:solidFill>
                 <a:ea typeface="Calibri" panose="020F0502020204030204" pitchFamily="34" charset="0"/>
                 <a:cs typeface="Times New Roman" panose="02020603050405020304" pitchFamily="18" charset="0"/>
-                <a:hlinkClick r:id="rId17">
+                <a:hlinkClick r:id="rId20">
                   <a:extLst>
                     <a:ext uri="{A12FA001-AC4F-418D-AE19-62706E023703}">
                       <ahyp:hlinkClr xmlns:ahyp="http://schemas.microsoft.com/office/drawing/2018/hyperlinkcolor" val="tx"/>
@@ -9018,7 +9018,7 @@
       <p:sp>
         <p:nvSpPr>
           <p:cNvPr id="101" name="Rounded Rectangle 100">
-            <a:hlinkClick r:id="rId18"/>
+            <a:hlinkClick r:id="rId21"/>
             <a:extLst>
               <a:ext uri="{FF2B5EF4-FFF2-40B4-BE49-F238E27FC236}">
                 <a16:creationId xmlns:a16="http://schemas.microsoft.com/office/drawing/2014/main" id="{277F05A2-578E-CE44-8D16-1C9B8390C4BE}"/>
@@ -9110,7 +9110,7 @@
                 </a:solidFill>
                 <a:ea typeface="Calibri" panose="020F0502020204030204" pitchFamily="34" charset="0"/>
                 <a:cs typeface="Times New Roman (Body CS)"/>
-                <a:hlinkClick r:id="rId18">
+                <a:hlinkClick r:id="rId21">
                   <a:extLst>
                     <a:ext uri="{A12FA001-AC4F-418D-AE19-62706E023703}">
                       <ahyp:hlinkClr xmlns:ahyp="http://schemas.microsoft.com/office/drawing/2018/hyperlinkcolor" val="tx"/>
@@ -9464,7 +9464,7 @@
       <p:sp>
         <p:nvSpPr>
           <p:cNvPr id="107" name="Rounded Rectangle 106">
-            <a:hlinkClick r:id="rId19"/>
+            <a:hlinkClick r:id="rId22"/>
             <a:extLst>
               <a:ext uri="{FF2B5EF4-FFF2-40B4-BE49-F238E27FC236}">
                 <a16:creationId xmlns:a16="http://schemas.microsoft.com/office/drawing/2014/main" id="{F710C858-9445-4047-B0DE-9E858A01422E}"/>
@@ -9556,7 +9556,7 @@
                 </a:solidFill>
                 <a:ea typeface="Calibri" panose="020F0502020204030204" pitchFamily="34" charset="0"/>
                 <a:cs typeface="Times New Roman (Body CS)"/>
-                <a:hlinkClick r:id="rId19">
+                <a:hlinkClick r:id="rId22">
                   <a:extLst>
                     <a:ext uri="{A12FA001-AC4F-418D-AE19-62706E023703}">
                       <ahyp:hlinkClr xmlns:ahyp="http://schemas.microsoft.com/office/drawing/2018/hyperlinkcolor" val="tx"/>
@@ -10257,7 +10257,7 @@
       <p:sp>
         <p:nvSpPr>
           <p:cNvPr id="122" name="Rounded Rectangle 121">
-            <a:hlinkClick r:id="rId20"/>
+            <a:hlinkClick r:id="rId23"/>
             <a:extLst>
               <a:ext uri="{FF2B5EF4-FFF2-40B4-BE49-F238E27FC236}">
                 <a16:creationId xmlns:a16="http://schemas.microsoft.com/office/drawing/2014/main" id="{28C89159-3DB5-DB49-B242-85F3F62376C9}"/>
@@ -10345,7 +10345,7 @@
                 </a:solidFill>
                 <a:ea typeface="Calibri" panose="020F0502020204030204" pitchFamily="34" charset="0"/>
                 <a:cs typeface="Times New Roman (Body CS)"/>
-                <a:hlinkClick r:id="rId20">
+                <a:hlinkClick r:id="rId23">
                   <a:extLst>
                     <a:ext uri="{A12FA001-AC4F-418D-AE19-62706E023703}">
                       <ahyp:hlinkClr xmlns:ahyp="http://schemas.microsoft.com/office/drawing/2018/hyperlinkcolor" val="tx"/>
@@ -10471,7 +10471,7 @@
       <p:sp>
         <p:nvSpPr>
           <p:cNvPr id="124" name="Rounded Rectangle 123">
-            <a:hlinkClick r:id="rId21"/>
+            <a:hlinkClick r:id="rId24"/>
             <a:extLst>
               <a:ext uri="{FF2B5EF4-FFF2-40B4-BE49-F238E27FC236}">
                 <a16:creationId xmlns:a16="http://schemas.microsoft.com/office/drawing/2014/main" id="{352B44AF-C2EE-9B41-894A-E04DC4439C6C}"/>
@@ -10559,7 +10559,7 @@
                 </a:solidFill>
                 <a:ea typeface="Calibri" panose="020F0502020204030204" pitchFamily="34" charset="0"/>
                 <a:cs typeface="Times New Roman (Body CS)"/>
-                <a:hlinkClick r:id="rId21">
+                <a:hlinkClick r:id="rId24">
                   <a:extLst>
                     <a:ext uri="{A12FA001-AC4F-418D-AE19-62706E023703}">
                       <ahyp:hlinkClr xmlns:ahyp="http://schemas.microsoft.com/office/drawing/2018/hyperlinkcolor" val="tx"/>
@@ -10786,7 +10786,7 @@
       <p:sp>
         <p:nvSpPr>
           <p:cNvPr id="134" name="Rounded Rectangle 133">
-            <a:hlinkClick r:id="rId22"/>
+            <a:hlinkClick r:id="rId25"/>
             <a:extLst>
               <a:ext uri="{FF2B5EF4-FFF2-40B4-BE49-F238E27FC236}">
                 <a16:creationId xmlns:a16="http://schemas.microsoft.com/office/drawing/2014/main" id="{45281CA5-E4A1-2A4F-83DF-275D386BBA79}"/>
@@ -10874,7 +10874,7 @@
                 </a:solidFill>
                 <a:ea typeface="Calibri" panose="020F0502020204030204" pitchFamily="34" charset="0"/>
                 <a:cs typeface="Times New Roman (Body CS)"/>
-                <a:hlinkClick r:id="rId22">
+                <a:hlinkClick r:id="rId25">
                   <a:extLst>
                     <a:ext uri="{A12FA001-AC4F-418D-AE19-62706E023703}">
                       <ahyp:hlinkClr xmlns:ahyp="http://schemas.microsoft.com/office/drawing/2018/hyperlinkcolor" val="tx"/>
@@ -10894,7 +10894,7 @@
                 </a:solidFill>
                 <a:ea typeface="Calibri" panose="020F0502020204030204" pitchFamily="34" charset="0"/>
                 <a:cs typeface="Times New Roman" panose="02020603050405020304" pitchFamily="18" charset="0"/>
-                <a:hlinkClick r:id="rId22">
+                <a:hlinkClick r:id="rId25">
                   <a:extLst>
                     <a:ext uri="{A12FA001-AC4F-418D-AE19-62706E023703}">
                       <ahyp:hlinkClr xmlns:ahyp="http://schemas.microsoft.com/office/drawing/2018/hyperlinkcolor" val="tx"/>
@@ -12085,11 +12085,11 @@
             <p:nvPr/>
           </p:nvPicPr>
           <p:blipFill>
-            <a:blip r:embed="rId23">
+            <a:blip r:embed="rId26">
               <a:extLst>
                 <a:ext uri="{BEBA8EAE-BF5A-486C-A8C5-ECC9F3942E4B}">
                   <a14:imgProps xmlns:a14="http://schemas.microsoft.com/office/drawing/2010/main">
-                    <a14:imgLayer r:embed="rId24">
+                    <a14:imgLayer r:embed="rId27">
                       <a14:imgEffect>
                         <a14:backgroundRemoval t="1535" b="97187" l="2821" r="98462">
                           <a14:foregroundMark x1="23333" y1="65985" x2="25641" y2="27877"/>
@@ -12387,6 +12387,108 @@
           </p:sp>
         </p:grpSp>
       </p:grpSp>
+      <p:sp>
+        <p:nvSpPr>
+          <p:cNvPr id="131" name="Rounded Rectangle 130">
+            <a:hlinkClick r:id="rId12"/>
+            <a:extLst>
+              <a:ext uri="{FF2B5EF4-FFF2-40B4-BE49-F238E27FC236}">
+                <a16:creationId xmlns:a16="http://schemas.microsoft.com/office/drawing/2014/main" id="{F22257EC-C010-BA46-9AE4-51D5BE870236}"/>
+              </a:ext>
+            </a:extLst>
+          </p:cNvPr>
+          <p:cNvSpPr/>
+          <p:nvPr/>
+        </p:nvSpPr>
+        <p:spPr>
+          <a:xfrm>
+            <a:off x="2512493" y="12005628"/>
+            <a:ext cx="1242567" cy="673735"/>
+          </a:xfrm>
+          <a:prstGeom prst="roundRect">
+            <a:avLst/>
+          </a:prstGeom>
+          <a:gradFill flip="none" rotWithShape="1">
+            <a:gsLst>
+              <a:gs pos="0">
+                <a:srgbClr val="226678"/>
+              </a:gs>
+              <a:gs pos="50000">
+                <a:srgbClr val="3694AF"/>
+              </a:gs>
+              <a:gs pos="100000">
+                <a:srgbClr val="42B1CF"/>
+              </a:gs>
+            </a:gsLst>
+            <a:lin ang="18900000" scaled="1"/>
+            <a:tileRect/>
+          </a:gradFill>
+          <a:ln>
+            <a:solidFill>
+              <a:srgbClr val="226678"/>
+            </a:solidFill>
+          </a:ln>
+          <a:effectLst>
+            <a:outerShdw blurRad="50800" dist="38100" dir="8100000" algn="tr" rotWithShape="0">
+              <a:prstClr val="black">
+                <a:alpha val="40000"/>
+              </a:prstClr>
+            </a:outerShdw>
+          </a:effectLst>
+        </p:spPr>
+        <p:style>
+          <a:lnRef idx="2">
+            <a:schemeClr val="accent1">
+              <a:shade val="50000"/>
+            </a:schemeClr>
+          </a:lnRef>
+          <a:fillRef idx="1">
+            <a:schemeClr val="accent1"/>
+          </a:fillRef>
+          <a:effectRef idx="0">
+            <a:schemeClr val="accent1"/>
+          </a:effectRef>
+          <a:fontRef idx="minor">
+            <a:schemeClr val="lt1"/>
+          </a:fontRef>
+        </p:style>
+        <p:txBody>
+          <a:bodyPr rot="0" spcFirstLastPara="0" vert="horz" wrap="square" lIns="91440" tIns="45720" rIns="91440" bIns="45720" numCol="1" spcCol="0" rtlCol="0" fromWordArt="0" anchor="t" anchorCtr="0" forceAA="0" compatLnSpc="1">
+            <a:prstTxWarp prst="textNoShape">
+              <a:avLst/>
+            </a:prstTxWarp>
+            <a:noAutofit/>
+          </a:bodyPr>
+          <a:lstStyle/>
+          <a:p>
+            <a:pPr algn="ctr"/>
+            <a:r>
+              <a:rPr lang="en-US" b="1" cap="small" dirty="0">
+                <a:solidFill>
+                  <a:schemeClr val="bg1"/>
+                </a:solidFill>
+                <a:ea typeface="Calibri" panose="020F0502020204030204" pitchFamily="34" charset="0"/>
+                <a:cs typeface="Times New Roman" panose="02020603050405020304" pitchFamily="18" charset="0"/>
+                <a:hlinkClick r:id="rId28">
+                  <a:extLst>
+                    <a:ext uri="{A12FA001-AC4F-418D-AE19-62706E023703}">
+                      <ahyp:hlinkClr xmlns:ahyp="http://schemas.microsoft.com/office/drawing/2018/hyperlinkcolor" val="tx"/>
+                    </a:ext>
+                  </a:extLst>
+                </a:hlinkClick>
+              </a:rPr>
+              <a:t>Why use DATALAD?</a:t>
+            </a:r>
+            <a:endParaRPr lang="en-US" dirty="0">
+              <a:solidFill>
+                <a:schemeClr val="bg1"/>
+              </a:solidFill>
+              <a:ea typeface="Calibri" panose="020F0502020204030204" pitchFamily="34" charset="0"/>
+              <a:cs typeface="Times New Roman" panose="02020603050405020304" pitchFamily="18" charset="0"/>
+            </a:endParaRPr>
+          </a:p>
+        </p:txBody>
+      </p:sp>
     </p:spTree>
     <p:extLst>
       <p:ext uri="{BB962C8B-B14F-4D97-AF65-F5344CB8AC3E}">

</xml_diff>

<commit_message>
updating the timeline yet again...
</commit_message>
<xml_diff>
--- a/docs/_static/Timeline_Finalized_Linked.pptx
+++ b/docs/_static/Timeline_Finalized_Linked.pptx
@@ -4590,7 +4590,41 @@
                   </a:extLst>
                 </a:hlinkClick>
               </a:rPr>
-              <a:t>Design Your Experiment</a:t>
+              <a:t>Design </a:t>
+            </a:r>
+            <a:r>
+              <a:rPr lang="en-US" b="1" cap="small" dirty="0">
+                <a:solidFill>
+                  <a:schemeClr val="bg1"/>
+                </a:solidFill>
+                <a:ea typeface="Calibri" panose="020F0502020204030204" pitchFamily="34" charset="0"/>
+                <a:cs typeface="Times New Roman (Body CS)"/>
+                <a:hlinkClick r:id="rId5">
+                  <a:extLst>
+                    <a:ext uri="{A12FA001-AC4F-418D-AE19-62706E023703}">
+                      <ahyp:hlinkClr xmlns:ahyp="http://schemas.microsoft.com/office/drawing/2018/hyperlinkcolor" val="tx"/>
+                    </a:ext>
+                  </a:extLst>
+                </a:hlinkClick>
+              </a:rPr>
+              <a:t>Your</a:t>
+            </a:r>
+            <a:r>
+              <a:rPr lang="en-US" b="1" cap="small" dirty="0">
+                <a:solidFill>
+                  <a:schemeClr val="bg1"/>
+                </a:solidFill>
+                <a:ea typeface="Calibri" panose="020F0502020204030204" pitchFamily="34" charset="0"/>
+                <a:cs typeface="Times New Roman (Body CS)"/>
+                <a:hlinkClick r:id="rId4">
+                  <a:extLst>
+                    <a:ext uri="{A12FA001-AC4F-418D-AE19-62706E023703}">
+                      <ahyp:hlinkClr xmlns:ahyp="http://schemas.microsoft.com/office/drawing/2018/hyperlinkcolor" val="tx"/>
+                    </a:ext>
+                  </a:extLst>
+                </a:hlinkClick>
+              </a:rPr>
+              <a:t> Experiment</a:t>
             </a:r>
             <a:endParaRPr lang="en-US" dirty="0">
               <a:solidFill>
@@ -4605,7 +4639,7 @@
       <p:sp>
         <p:nvSpPr>
           <p:cNvPr id="15" name="Rounded Rectangle 14">
-            <a:hlinkClick r:id="rId5"/>
+            <a:hlinkClick r:id="rId6"/>
             <a:extLst>
               <a:ext uri="{FF2B5EF4-FFF2-40B4-BE49-F238E27FC236}">
                 <a16:creationId xmlns:a16="http://schemas.microsoft.com/office/drawing/2014/main" id="{6445E7F9-C63C-0D4E-AC02-7CAFAF240540}"/>
@@ -4686,7 +4720,7 @@
                 </a:solidFill>
                 <a:ea typeface="Calibri" panose="020F0502020204030204" pitchFamily="34" charset="0"/>
                 <a:cs typeface="Times New Roman (Body CS)"/>
-                <a:hlinkClick r:id="rId6">
+                <a:hlinkClick r:id="rId7">
                   <a:extLst>
                     <a:ext uri="{A12FA001-AC4F-418D-AE19-62706E023703}">
                       <ahyp:hlinkClr xmlns:ahyp="http://schemas.microsoft.com/office/drawing/2018/hyperlinkcolor" val="tx"/>
@@ -5199,7 +5233,7 @@
       <p:sp>
         <p:nvSpPr>
           <p:cNvPr id="34" name="Rounded Rectangle 33">
-            <a:hlinkClick r:id="rId5"/>
+            <a:hlinkClick r:id="rId6"/>
             <a:extLst>
               <a:ext uri="{FF2B5EF4-FFF2-40B4-BE49-F238E27FC236}">
                 <a16:creationId xmlns:a16="http://schemas.microsoft.com/office/drawing/2014/main" id="{5630FB77-FDCE-0343-B816-FF9E25DDF5D9}"/>
@@ -5280,7 +5314,7 @@
                 </a:solidFill>
                 <a:ea typeface="Calibri" panose="020F0502020204030204" pitchFamily="34" charset="0"/>
                 <a:cs typeface="Times New Roman (Body CS)"/>
-                <a:hlinkClick r:id="rId6">
+                <a:hlinkClick r:id="rId7">
                   <a:extLst>
                     <a:ext uri="{A12FA001-AC4F-418D-AE19-62706E023703}">
                       <ahyp:hlinkClr xmlns:ahyp="http://schemas.microsoft.com/office/drawing/2018/hyperlinkcolor" val="tx"/>
@@ -6065,7 +6099,7 @@
       <p:sp>
         <p:nvSpPr>
           <p:cNvPr id="52" name="Rounded Rectangle 51">
-            <a:hlinkClick r:id="rId7"/>
+            <a:hlinkClick r:id="rId8"/>
             <a:extLst>
               <a:ext uri="{FF2B5EF4-FFF2-40B4-BE49-F238E27FC236}">
                 <a16:creationId xmlns:a16="http://schemas.microsoft.com/office/drawing/2014/main" id="{8F8B14DD-5B82-9547-8B90-9D528B21299B}"/>
@@ -6150,7 +6184,7 @@
                 </a:solidFill>
                 <a:ea typeface="Calibri" panose="020F0502020204030204" pitchFamily="34" charset="0"/>
                 <a:cs typeface="Times New Roman (Body CS)"/>
-                <a:hlinkClick r:id="rId7">
+                <a:hlinkClick r:id="rId8">
                   <a:extLst>
                     <a:ext uri="{A12FA001-AC4F-418D-AE19-62706E023703}">
                       <ahyp:hlinkClr xmlns:ahyp="http://schemas.microsoft.com/office/drawing/2018/hyperlinkcolor" val="tx"/>
@@ -6273,7 +6307,7 @@
       <p:sp>
         <p:nvSpPr>
           <p:cNvPr id="54" name="Rounded Rectangle 53">
-            <a:hlinkClick r:id="rId8"/>
+            <a:hlinkClick r:id="rId9"/>
             <a:extLst>
               <a:ext uri="{FF2B5EF4-FFF2-40B4-BE49-F238E27FC236}">
                 <a16:creationId xmlns:a16="http://schemas.microsoft.com/office/drawing/2014/main" id="{8DF4BEE3-0C9E-844D-BBA5-7D15B696D91F}"/>
@@ -6358,7 +6392,7 @@
                 </a:solidFill>
                 <a:ea typeface="Calibri" panose="020F0502020204030204" pitchFamily="34" charset="0"/>
                 <a:cs typeface="Times New Roman (Body CS)"/>
-                <a:hlinkClick r:id="rId8">
+                <a:hlinkClick r:id="rId9">
                   <a:extLst>
                     <a:ext uri="{A12FA001-AC4F-418D-AE19-62706E023703}">
                       <ahyp:hlinkClr xmlns:ahyp="http://schemas.microsoft.com/office/drawing/2018/hyperlinkcolor" val="tx"/>
@@ -6381,7 +6415,7 @@
       <p:sp>
         <p:nvSpPr>
           <p:cNvPr id="57" name="Rounded Rectangle 56">
-            <a:hlinkClick r:id="rId9"/>
+            <a:hlinkClick r:id="rId10"/>
             <a:extLst>
               <a:ext uri="{FF2B5EF4-FFF2-40B4-BE49-F238E27FC236}">
                 <a16:creationId xmlns:a16="http://schemas.microsoft.com/office/drawing/2014/main" id="{130B27E3-54A0-F444-856F-95E54674E36B}"/>
@@ -6462,7 +6496,7 @@
                 </a:solidFill>
                 <a:ea typeface="Calibri" panose="020F0502020204030204" pitchFamily="34" charset="0"/>
                 <a:cs typeface="Times New Roman (Body CS)"/>
-                <a:hlinkClick r:id="rId9">
+                <a:hlinkClick r:id="rId10">
                   <a:extLst>
                     <a:ext uri="{A12FA001-AC4F-418D-AE19-62706E023703}">
                       <ahyp:hlinkClr xmlns:ahyp="http://schemas.microsoft.com/office/drawing/2018/hyperlinkcolor" val="tx"/>
@@ -6485,7 +6519,7 @@
       <p:sp>
         <p:nvSpPr>
           <p:cNvPr id="58" name="Rounded Rectangle 57">
-            <a:hlinkClick r:id="rId10"/>
+            <a:hlinkClick r:id="rId11"/>
             <a:extLst>
               <a:ext uri="{FF2B5EF4-FFF2-40B4-BE49-F238E27FC236}">
                 <a16:creationId xmlns:a16="http://schemas.microsoft.com/office/drawing/2014/main" id="{98DBCBB0-7F93-D248-ABE4-670F9CE80FD3}"/>
@@ -6570,7 +6604,7 @@
                 </a:solidFill>
                 <a:ea typeface="Calibri" panose="020F0502020204030204" pitchFamily="34" charset="0"/>
                 <a:cs typeface="Times New Roman (Body CS)"/>
-                <a:hlinkClick r:id="rId10">
+                <a:hlinkClick r:id="rId11">
                   <a:extLst>
                     <a:ext uri="{A12FA001-AC4F-418D-AE19-62706E023703}">
                       <ahyp:hlinkClr xmlns:ahyp="http://schemas.microsoft.com/office/drawing/2018/hyperlinkcolor" val="tx"/>
@@ -6578,7 +6612,24 @@
                   </a:extLst>
                 </a:hlinkClick>
               </a:rPr>
-              <a:t>Program Card Setup using Reproin</a:t>
+              <a:t>Program</a:t>
+            </a:r>
+            <a:r>
+              <a:rPr lang="en-US" b="1" cap="small" dirty="0">
+                <a:solidFill>
+                  <a:schemeClr val="bg1"/>
+                </a:solidFill>
+                <a:ea typeface="Calibri" panose="020F0502020204030204" pitchFamily="34" charset="0"/>
+                <a:cs typeface="Times New Roman (Body CS)"/>
+                <a:hlinkClick r:id="rId11">
+                  <a:extLst>
+                    <a:ext uri="{A12FA001-AC4F-418D-AE19-62706E023703}">
+                      <ahyp:hlinkClr xmlns:ahyp="http://schemas.microsoft.com/office/drawing/2018/hyperlinkcolor" val="tx"/>
+                    </a:ext>
+                  </a:extLst>
+                </a:hlinkClick>
+              </a:rPr>
+              <a:t> Card Setup using Reproin</a:t>
             </a:r>
             <a:endParaRPr lang="en-US" dirty="0">
               <a:solidFill>
@@ -6593,7 +6644,7 @@
       <p:sp>
         <p:nvSpPr>
           <p:cNvPr id="63" name="Rounded Rectangle 62">
-            <a:hlinkClick r:id="rId11"/>
+            <a:hlinkClick r:id="rId12"/>
             <a:extLst>
               <a:ext uri="{FF2B5EF4-FFF2-40B4-BE49-F238E27FC236}">
                 <a16:creationId xmlns:a16="http://schemas.microsoft.com/office/drawing/2014/main" id="{4382A558-D8EB-D14F-9884-259A47BF19F7}"/>
@@ -6674,7 +6725,7 @@
                 </a:solidFill>
                 <a:ea typeface="Calibri" panose="020F0502020204030204" pitchFamily="34" charset="0"/>
                 <a:cs typeface="Times New Roman (Body CS)"/>
-                <a:hlinkClick r:id="rId11">
+                <a:hlinkClick r:id="rId12">
                   <a:extLst>
                     <a:ext uri="{A12FA001-AC4F-418D-AE19-62706E023703}">
                       <ahyp:hlinkClr xmlns:ahyp="http://schemas.microsoft.com/office/drawing/2018/hyperlinkcolor" val="tx"/>
@@ -6840,7 +6891,7 @@
       <p:sp>
         <p:nvSpPr>
           <p:cNvPr id="66" name="Rounded Rectangle 65">
-            <a:hlinkClick r:id="rId12"/>
+            <a:hlinkClick r:id="rId13"/>
             <a:extLst>
               <a:ext uri="{FF2B5EF4-FFF2-40B4-BE49-F238E27FC236}">
                 <a16:creationId xmlns:a16="http://schemas.microsoft.com/office/drawing/2014/main" id="{23EA373B-A672-8D46-B9D2-FEFBFBF10314}"/>
@@ -6919,7 +6970,7 @@
                 </a:solidFill>
                 <a:ea typeface="Calibri" panose="020F0502020204030204" pitchFamily="34" charset="0"/>
                 <a:cs typeface="Times New Roman" panose="02020603050405020304" pitchFamily="18" charset="0"/>
-                <a:hlinkClick r:id="rId13">
+                <a:hlinkClick r:id="rId14">
                   <a:extLst>
                     <a:ext uri="{A12FA001-AC4F-418D-AE19-62706E023703}">
                       <ahyp:hlinkClr xmlns:ahyp="http://schemas.microsoft.com/office/drawing/2018/hyperlinkcolor" val="tx"/>
@@ -6942,7 +6993,7 @@
       <p:sp>
         <p:nvSpPr>
           <p:cNvPr id="67" name="Rounded Rectangle 66">
-            <a:hlinkClick r:id="rId14"/>
+            <a:hlinkClick r:id="rId15"/>
             <a:extLst>
               <a:ext uri="{FF2B5EF4-FFF2-40B4-BE49-F238E27FC236}">
                 <a16:creationId xmlns:a16="http://schemas.microsoft.com/office/drawing/2014/main" id="{B3FB1FE2-96B9-1E40-8274-A017814B3DD9}"/>
@@ -7021,7 +7072,7 @@
                 </a:solidFill>
                 <a:ea typeface="Calibri" panose="020F0502020204030204" pitchFamily="34" charset="0"/>
                 <a:cs typeface="Times New Roman" panose="02020603050405020304" pitchFamily="18" charset="0"/>
-                <a:hlinkClick r:id="rId14">
+                <a:hlinkClick r:id="rId15">
                   <a:extLst>
                     <a:ext uri="{A12FA001-AC4F-418D-AE19-62706E023703}">
                       <ahyp:hlinkClr xmlns:ahyp="http://schemas.microsoft.com/office/drawing/2018/hyperlinkcolor" val="tx"/>
@@ -7125,7 +7176,7 @@
       <p:sp>
         <p:nvSpPr>
           <p:cNvPr id="69" name="Rounded Rectangle 68">
-            <a:hlinkClick r:id="rId15"/>
+            <a:hlinkClick r:id="rId16"/>
             <a:extLst>
               <a:ext uri="{FF2B5EF4-FFF2-40B4-BE49-F238E27FC236}">
                 <a16:creationId xmlns:a16="http://schemas.microsoft.com/office/drawing/2014/main" id="{FAC11A01-3E34-5544-9C85-62B46194F0FA}"/>
@@ -7204,7 +7255,7 @@
                 </a:solidFill>
                 <a:ea typeface="Calibri" panose="020F0502020204030204" pitchFamily="34" charset="0"/>
                 <a:cs typeface="Times New Roman" panose="02020603050405020304" pitchFamily="18" charset="0"/>
-                <a:hlinkClick r:id="rId15">
+                <a:hlinkClick r:id="rId16">
                   <a:extLst>
                     <a:ext uri="{A12FA001-AC4F-418D-AE19-62706E023703}">
                       <ahyp:hlinkClr xmlns:ahyp="http://schemas.microsoft.com/office/drawing/2018/hyperlinkcolor" val="tx"/>
@@ -7227,7 +7278,7 @@
       <p:sp>
         <p:nvSpPr>
           <p:cNvPr id="70" name="Rounded Rectangle 69">
-            <a:hlinkClick r:id="rId16"/>
+            <a:hlinkClick r:id="rId17"/>
             <a:extLst>
               <a:ext uri="{FF2B5EF4-FFF2-40B4-BE49-F238E27FC236}">
                 <a16:creationId xmlns:a16="http://schemas.microsoft.com/office/drawing/2014/main" id="{5C38F2D3-6237-DA43-AC12-2BEBD8215185}"/>
@@ -7306,7 +7357,7 @@
                 </a:solidFill>
                 <a:ea typeface="Calibri" panose="020F0502020204030204" pitchFamily="34" charset="0"/>
                 <a:cs typeface="Times New Roman" panose="02020603050405020304" pitchFamily="18" charset="0"/>
-                <a:hlinkClick r:id="rId16">
+                <a:hlinkClick r:id="rId17">
                   <a:extLst>
                     <a:ext uri="{A12FA001-AC4F-418D-AE19-62706E023703}">
                       <ahyp:hlinkClr xmlns:ahyp="http://schemas.microsoft.com/office/drawing/2018/hyperlinkcolor" val="tx"/>
@@ -7329,7 +7380,7 @@
       <p:sp>
         <p:nvSpPr>
           <p:cNvPr id="71" name="Rounded Rectangle 70">
-            <a:hlinkClick r:id="rId17"/>
+            <a:hlinkClick r:id="rId18"/>
             <a:extLst>
               <a:ext uri="{FF2B5EF4-FFF2-40B4-BE49-F238E27FC236}">
                 <a16:creationId xmlns:a16="http://schemas.microsoft.com/office/drawing/2014/main" id="{FEB7B85A-DEFF-D94C-90D6-ABC39142A66B}"/>
@@ -7408,7 +7459,7 @@
                 </a:solidFill>
                 <a:ea typeface="Calibri" panose="020F0502020204030204" pitchFamily="34" charset="0"/>
                 <a:cs typeface="Times New Roman" panose="02020603050405020304" pitchFamily="18" charset="0"/>
-                <a:hlinkClick r:id="rId17">
+                <a:hlinkClick r:id="rId18">
                   <a:extLst>
                     <a:ext uri="{A12FA001-AC4F-418D-AE19-62706E023703}">
                       <ahyp:hlinkClr xmlns:ahyp="http://schemas.microsoft.com/office/drawing/2018/hyperlinkcolor" val="tx"/>
@@ -7635,7 +7686,7 @@
       <p:sp>
         <p:nvSpPr>
           <p:cNvPr id="93" name="Rounded Rectangle 92">
-            <a:hlinkClick r:id="rId18"/>
+            <a:hlinkClick r:id="rId19"/>
             <a:extLst>
               <a:ext uri="{FF2B5EF4-FFF2-40B4-BE49-F238E27FC236}">
                 <a16:creationId xmlns:a16="http://schemas.microsoft.com/office/drawing/2014/main" id="{827F4B31-7E46-224A-8922-B86E87040F91}"/>
@@ -7714,7 +7765,7 @@
                 </a:solidFill>
                 <a:ea typeface="Calibri" panose="020F0502020204030204" pitchFamily="34" charset="0"/>
                 <a:cs typeface="Times New Roman" panose="02020603050405020304" pitchFamily="18" charset="0"/>
-                <a:hlinkClick r:id="rId18">
+                <a:hlinkClick r:id="rId19">
                   <a:extLst>
                     <a:ext uri="{A12FA001-AC4F-418D-AE19-62706E023703}">
                       <ahyp:hlinkClr xmlns:ahyp="http://schemas.microsoft.com/office/drawing/2018/hyperlinkcolor" val="tx"/>
@@ -7731,7 +7782,7 @@
                 </a:solidFill>
                 <a:ea typeface="Calibri" panose="020F0502020204030204" pitchFamily="34" charset="0"/>
                 <a:cs typeface="Times New Roman" panose="02020603050405020304" pitchFamily="18" charset="0"/>
-                <a:hlinkClick r:id="rId18">
+                <a:hlinkClick r:id="rId19">
                   <a:extLst>
                     <a:ext uri="{A12FA001-AC4F-418D-AE19-62706E023703}">
                       <ahyp:hlinkClr xmlns:ahyp="http://schemas.microsoft.com/office/drawing/2018/hyperlinkcolor" val="tx"/>
@@ -7748,7 +7799,7 @@
                 </a:solidFill>
                 <a:ea typeface="Calibri" panose="020F0502020204030204" pitchFamily="34" charset="0"/>
                 <a:cs typeface="Times New Roman" panose="02020603050405020304" pitchFamily="18" charset="0"/>
-                <a:hlinkClick r:id="rId18">
+                <a:hlinkClick r:id="rId19">
                   <a:extLst>
                     <a:ext uri="{A12FA001-AC4F-418D-AE19-62706E023703}">
                       <ahyp:hlinkClr xmlns:ahyp="http://schemas.microsoft.com/office/drawing/2018/hyperlinkcolor" val="tx"/>
@@ -7979,7 +8030,7 @@
       <p:sp>
         <p:nvSpPr>
           <p:cNvPr id="98" name="Rounded Rectangle 97">
-            <a:hlinkClick r:id="rId19"/>
+            <a:hlinkClick r:id="rId20"/>
             <a:extLst>
               <a:ext uri="{FF2B5EF4-FFF2-40B4-BE49-F238E27FC236}">
                 <a16:creationId xmlns:a16="http://schemas.microsoft.com/office/drawing/2014/main" id="{0D6F03FA-B07D-D347-B952-71B5378F3242}"/>
@@ -8058,7 +8109,7 @@
                 </a:solidFill>
                 <a:ea typeface="Calibri" panose="020F0502020204030204" pitchFamily="34" charset="0"/>
                 <a:cs typeface="Times New Roman" panose="02020603050405020304" pitchFamily="18" charset="0"/>
-                <a:hlinkClick r:id="rId19">
+                <a:hlinkClick r:id="rId20">
                   <a:extLst>
                     <a:ext uri="{A12FA001-AC4F-418D-AE19-62706E023703}">
                       <ahyp:hlinkClr xmlns:ahyp="http://schemas.microsoft.com/office/drawing/2018/hyperlinkcolor" val="tx"/>
@@ -8078,7 +8129,7 @@
                 </a:solidFill>
                 <a:ea typeface="Calibri" panose="020F0502020204030204" pitchFamily="34" charset="0"/>
                 <a:cs typeface="Times New Roman" panose="02020603050405020304" pitchFamily="18" charset="0"/>
-                <a:hlinkClick r:id="rId19">
+                <a:hlinkClick r:id="rId20">
                   <a:extLst>
                     <a:ext uri="{A12FA001-AC4F-418D-AE19-62706E023703}">
                       <ahyp:hlinkClr xmlns:ahyp="http://schemas.microsoft.com/office/drawing/2018/hyperlinkcolor" val="tx"/>
@@ -8095,7 +8146,7 @@
                 </a:solidFill>
                 <a:ea typeface="Calibri" panose="020F0502020204030204" pitchFamily="34" charset="0"/>
                 <a:cs typeface="Times New Roman" panose="02020603050405020304" pitchFamily="18" charset="0"/>
-                <a:hlinkClick r:id="rId19">
+                <a:hlinkClick r:id="rId20">
                   <a:extLst>
                     <a:ext uri="{A12FA001-AC4F-418D-AE19-62706E023703}">
                       <ahyp:hlinkClr xmlns:ahyp="http://schemas.microsoft.com/office/drawing/2018/hyperlinkcolor" val="tx"/>
@@ -8112,7 +8163,7 @@
                 </a:solidFill>
                 <a:ea typeface="Calibri" panose="020F0502020204030204" pitchFamily="34" charset="0"/>
                 <a:cs typeface="Times New Roman" panose="02020603050405020304" pitchFamily="18" charset="0"/>
-                <a:hlinkClick r:id="rId19">
+                <a:hlinkClick r:id="rId20">
                   <a:extLst>
                     <a:ext uri="{A12FA001-AC4F-418D-AE19-62706E023703}">
                       <ahyp:hlinkClr xmlns:ahyp="http://schemas.microsoft.com/office/drawing/2018/hyperlinkcolor" val="tx"/>
@@ -8714,7 +8765,7 @@
       <p:sp>
         <p:nvSpPr>
           <p:cNvPr id="128" name="Rounded Rectangle 127">
-            <a:hlinkClick r:id="rId20"/>
+            <a:hlinkClick r:id="rId21"/>
             <a:extLst>
               <a:ext uri="{FF2B5EF4-FFF2-40B4-BE49-F238E27FC236}">
                 <a16:creationId xmlns:a16="http://schemas.microsoft.com/office/drawing/2014/main" id="{90D1B34F-24C9-6B40-9680-06F8F7ADCD3E}"/>
@@ -8802,7 +8853,7 @@
                 </a:solidFill>
                 <a:ea typeface="Calibri" panose="020F0502020204030204" pitchFamily="34" charset="0"/>
                 <a:cs typeface="Times New Roman" panose="02020603050405020304" pitchFamily="18" charset="0"/>
-                <a:hlinkClick r:id="rId20">
+                <a:hlinkClick r:id="rId21">
                   <a:extLst>
                     <a:ext uri="{A12FA001-AC4F-418D-AE19-62706E023703}">
                       <ahyp:hlinkClr xmlns:ahyp="http://schemas.microsoft.com/office/drawing/2018/hyperlinkcolor" val="tx"/>
@@ -9018,7 +9069,7 @@
       <p:sp>
         <p:nvSpPr>
           <p:cNvPr id="101" name="Rounded Rectangle 100">
-            <a:hlinkClick r:id="rId21"/>
+            <a:hlinkClick r:id="rId22"/>
             <a:extLst>
               <a:ext uri="{FF2B5EF4-FFF2-40B4-BE49-F238E27FC236}">
                 <a16:creationId xmlns:a16="http://schemas.microsoft.com/office/drawing/2014/main" id="{277F05A2-578E-CE44-8D16-1C9B8390C4BE}"/>
@@ -9110,7 +9161,7 @@
                 </a:solidFill>
                 <a:ea typeface="Calibri" panose="020F0502020204030204" pitchFamily="34" charset="0"/>
                 <a:cs typeface="Times New Roman (Body CS)"/>
-                <a:hlinkClick r:id="rId21">
+                <a:hlinkClick r:id="rId22">
                   <a:extLst>
                     <a:ext uri="{A12FA001-AC4F-418D-AE19-62706E023703}">
                       <ahyp:hlinkClr xmlns:ahyp="http://schemas.microsoft.com/office/drawing/2018/hyperlinkcolor" val="tx"/>
@@ -9464,7 +9515,7 @@
       <p:sp>
         <p:nvSpPr>
           <p:cNvPr id="107" name="Rounded Rectangle 106">
-            <a:hlinkClick r:id="rId22"/>
+            <a:hlinkClick r:id="rId23"/>
             <a:extLst>
               <a:ext uri="{FF2B5EF4-FFF2-40B4-BE49-F238E27FC236}">
                 <a16:creationId xmlns:a16="http://schemas.microsoft.com/office/drawing/2014/main" id="{F710C858-9445-4047-B0DE-9E858A01422E}"/>
@@ -9556,7 +9607,7 @@
                 </a:solidFill>
                 <a:ea typeface="Calibri" panose="020F0502020204030204" pitchFamily="34" charset="0"/>
                 <a:cs typeface="Times New Roman (Body CS)"/>
-                <a:hlinkClick r:id="rId22">
+                <a:hlinkClick r:id="rId23">
                   <a:extLst>
                     <a:ext uri="{A12FA001-AC4F-418D-AE19-62706E023703}">
                       <ahyp:hlinkClr xmlns:ahyp="http://schemas.microsoft.com/office/drawing/2018/hyperlinkcolor" val="tx"/>
@@ -10257,7 +10308,7 @@
       <p:sp>
         <p:nvSpPr>
           <p:cNvPr id="122" name="Rounded Rectangle 121">
-            <a:hlinkClick r:id="rId23"/>
+            <a:hlinkClick r:id="rId24"/>
             <a:extLst>
               <a:ext uri="{FF2B5EF4-FFF2-40B4-BE49-F238E27FC236}">
                 <a16:creationId xmlns:a16="http://schemas.microsoft.com/office/drawing/2014/main" id="{28C89159-3DB5-DB49-B242-85F3F62376C9}"/>
@@ -10345,7 +10396,7 @@
                 </a:solidFill>
                 <a:ea typeface="Calibri" panose="020F0502020204030204" pitchFamily="34" charset="0"/>
                 <a:cs typeface="Times New Roman (Body CS)"/>
-                <a:hlinkClick r:id="rId23">
+                <a:hlinkClick r:id="rId24">
                   <a:extLst>
                     <a:ext uri="{A12FA001-AC4F-418D-AE19-62706E023703}">
                       <ahyp:hlinkClr xmlns:ahyp="http://schemas.microsoft.com/office/drawing/2018/hyperlinkcolor" val="tx"/>
@@ -10471,7 +10522,7 @@
       <p:sp>
         <p:nvSpPr>
           <p:cNvPr id="124" name="Rounded Rectangle 123">
-            <a:hlinkClick r:id="rId24"/>
+            <a:hlinkClick r:id="rId25"/>
             <a:extLst>
               <a:ext uri="{FF2B5EF4-FFF2-40B4-BE49-F238E27FC236}">
                 <a16:creationId xmlns:a16="http://schemas.microsoft.com/office/drawing/2014/main" id="{352B44AF-C2EE-9B41-894A-E04DC4439C6C}"/>
@@ -10559,7 +10610,7 @@
                 </a:solidFill>
                 <a:ea typeface="Calibri" panose="020F0502020204030204" pitchFamily="34" charset="0"/>
                 <a:cs typeface="Times New Roman (Body CS)"/>
-                <a:hlinkClick r:id="rId24">
+                <a:hlinkClick r:id="rId25">
                   <a:extLst>
                     <a:ext uri="{A12FA001-AC4F-418D-AE19-62706E023703}">
                       <ahyp:hlinkClr xmlns:ahyp="http://schemas.microsoft.com/office/drawing/2018/hyperlinkcolor" val="tx"/>
@@ -10786,7 +10837,7 @@
       <p:sp>
         <p:nvSpPr>
           <p:cNvPr id="134" name="Rounded Rectangle 133">
-            <a:hlinkClick r:id="rId25"/>
+            <a:hlinkClick r:id="rId26"/>
             <a:extLst>
               <a:ext uri="{FF2B5EF4-FFF2-40B4-BE49-F238E27FC236}">
                 <a16:creationId xmlns:a16="http://schemas.microsoft.com/office/drawing/2014/main" id="{45281CA5-E4A1-2A4F-83DF-275D386BBA79}"/>
@@ -10874,7 +10925,7 @@
                 </a:solidFill>
                 <a:ea typeface="Calibri" panose="020F0502020204030204" pitchFamily="34" charset="0"/>
                 <a:cs typeface="Times New Roman (Body CS)"/>
-                <a:hlinkClick r:id="rId25">
+                <a:hlinkClick r:id="rId26">
                   <a:extLst>
                     <a:ext uri="{A12FA001-AC4F-418D-AE19-62706E023703}">
                       <ahyp:hlinkClr xmlns:ahyp="http://schemas.microsoft.com/office/drawing/2018/hyperlinkcolor" val="tx"/>
@@ -10894,7 +10945,7 @@
                 </a:solidFill>
                 <a:ea typeface="Calibri" panose="020F0502020204030204" pitchFamily="34" charset="0"/>
                 <a:cs typeface="Times New Roman" panose="02020603050405020304" pitchFamily="18" charset="0"/>
-                <a:hlinkClick r:id="rId25">
+                <a:hlinkClick r:id="rId26">
                   <a:extLst>
                     <a:ext uri="{A12FA001-AC4F-418D-AE19-62706E023703}">
                       <ahyp:hlinkClr xmlns:ahyp="http://schemas.microsoft.com/office/drawing/2018/hyperlinkcolor" val="tx"/>
@@ -12085,11 +12136,11 @@
             <p:nvPr/>
           </p:nvPicPr>
           <p:blipFill>
-            <a:blip r:embed="rId26">
+            <a:blip r:embed="rId27">
               <a:extLst>
                 <a:ext uri="{BEBA8EAE-BF5A-486C-A8C5-ECC9F3942E4B}">
                   <a14:imgProps xmlns:a14="http://schemas.microsoft.com/office/drawing/2010/main">
-                    <a14:imgLayer r:embed="rId27">
+                    <a14:imgLayer r:embed="rId28">
                       <a14:imgEffect>
                         <a14:backgroundRemoval t="1535" b="97187" l="2821" r="98462">
                           <a14:foregroundMark x1="23333" y1="65985" x2="25641" y2="27877"/>
@@ -12390,7 +12441,7 @@
       <p:sp>
         <p:nvSpPr>
           <p:cNvPr id="131" name="Rounded Rectangle 130">
-            <a:hlinkClick r:id="rId12"/>
+            <a:hlinkClick r:id="rId13"/>
             <a:extLst>
               <a:ext uri="{FF2B5EF4-FFF2-40B4-BE49-F238E27FC236}">
                 <a16:creationId xmlns:a16="http://schemas.microsoft.com/office/drawing/2014/main" id="{F22257EC-C010-BA46-9AE4-51D5BE870236}"/>
@@ -12469,7 +12520,7 @@
                 </a:solidFill>
                 <a:ea typeface="Calibri" panose="020F0502020204030204" pitchFamily="34" charset="0"/>
                 <a:cs typeface="Times New Roman" panose="02020603050405020304" pitchFamily="18" charset="0"/>
-                <a:hlinkClick r:id="rId28">
+                <a:hlinkClick r:id="rId29">
                   <a:extLst>
                     <a:ext uri="{A12FA001-AC4F-418D-AE19-62706E023703}">
                       <ahyp:hlinkClr xmlns:ahyp="http://schemas.microsoft.com/office/drawing/2018/hyperlinkcolor" val="tx"/>
@@ -12477,7 +12528,7 @@
                   </a:extLst>
                 </a:hlinkClick>
               </a:rPr>
-              <a:t>Why use DATALAD?</a:t>
+              <a:t>Why use DataLad?</a:t>
             </a:r>
             <a:endParaRPr lang="en-US" dirty="0">
               <a:solidFill>

</xml_diff>

<commit_message>
fixed the links in the flowchart
</commit_message>
<xml_diff>
--- a/docs/_static/Timeline_Finalized_Linked.pptx
+++ b/docs/_static/Timeline_Finalized_Linked.pptx
@@ -197,7 +197,7 @@
           <a:p>
             <a:fld id="{FB874BE1-A17F-6B49-9219-89EA812F27EA}" type="datetimeFigureOut">
               <a:rPr lang="en-US" smtClean="0"/>
-              <a:t>9/10/20</a:t>
+              <a:t>12/9/20</a:t>
             </a:fld>
             <a:endParaRPr lang="en-US"/>
           </a:p>
@@ -684,7 +684,7 @@
           <a:p>
             <a:fld id="{54235F48-D939-424A-B563-AE881225AA62}" type="datetimeFigureOut">
               <a:rPr lang="en-US" smtClean="0"/>
-              <a:t>9/10/20</a:t>
+              <a:t>12/9/20</a:t>
             </a:fld>
             <a:endParaRPr lang="en-US"/>
           </a:p>
@@ -854,7 +854,7 @@
           <a:p>
             <a:fld id="{54235F48-D939-424A-B563-AE881225AA62}" type="datetimeFigureOut">
               <a:rPr lang="en-US" smtClean="0"/>
-              <a:t>9/10/20</a:t>
+              <a:t>12/9/20</a:t>
             </a:fld>
             <a:endParaRPr lang="en-US"/>
           </a:p>
@@ -1034,7 +1034,7 @@
           <a:p>
             <a:fld id="{54235F48-D939-424A-B563-AE881225AA62}" type="datetimeFigureOut">
               <a:rPr lang="en-US" smtClean="0"/>
-              <a:t>9/10/20</a:t>
+              <a:t>12/9/20</a:t>
             </a:fld>
             <a:endParaRPr lang="en-US"/>
           </a:p>
@@ -1204,7 +1204,7 @@
           <a:p>
             <a:fld id="{54235F48-D939-424A-B563-AE881225AA62}" type="datetimeFigureOut">
               <a:rPr lang="en-US" smtClean="0"/>
-              <a:t>9/10/20</a:t>
+              <a:t>12/9/20</a:t>
             </a:fld>
             <a:endParaRPr lang="en-US"/>
           </a:p>
@@ -1448,7 +1448,7 @@
           <a:p>
             <a:fld id="{54235F48-D939-424A-B563-AE881225AA62}" type="datetimeFigureOut">
               <a:rPr lang="en-US" smtClean="0"/>
-              <a:t>9/10/20</a:t>
+              <a:t>12/9/20</a:t>
             </a:fld>
             <a:endParaRPr lang="en-US"/>
           </a:p>
@@ -1680,7 +1680,7 @@
           <a:p>
             <a:fld id="{54235F48-D939-424A-B563-AE881225AA62}" type="datetimeFigureOut">
               <a:rPr lang="en-US" smtClean="0"/>
-              <a:t>9/10/20</a:t>
+              <a:t>12/9/20</a:t>
             </a:fld>
             <a:endParaRPr lang="en-US"/>
           </a:p>
@@ -2047,7 +2047,7 @@
           <a:p>
             <a:fld id="{54235F48-D939-424A-B563-AE881225AA62}" type="datetimeFigureOut">
               <a:rPr lang="en-US" smtClean="0"/>
-              <a:t>9/10/20</a:t>
+              <a:t>12/9/20</a:t>
             </a:fld>
             <a:endParaRPr lang="en-US"/>
           </a:p>
@@ -2165,7 +2165,7 @@
           <a:p>
             <a:fld id="{54235F48-D939-424A-B563-AE881225AA62}" type="datetimeFigureOut">
               <a:rPr lang="en-US" smtClean="0"/>
-              <a:t>9/10/20</a:t>
+              <a:t>12/9/20</a:t>
             </a:fld>
             <a:endParaRPr lang="en-US"/>
           </a:p>
@@ -2260,7 +2260,7 @@
           <a:p>
             <a:fld id="{54235F48-D939-424A-B563-AE881225AA62}" type="datetimeFigureOut">
               <a:rPr lang="en-US" smtClean="0"/>
-              <a:t>9/10/20</a:t>
+              <a:t>12/9/20</a:t>
             </a:fld>
             <a:endParaRPr lang="en-US"/>
           </a:p>
@@ -2537,7 +2537,7 @@
           <a:p>
             <a:fld id="{54235F48-D939-424A-B563-AE881225AA62}" type="datetimeFigureOut">
               <a:rPr lang="en-US" smtClean="0"/>
-              <a:t>9/10/20</a:t>
+              <a:t>12/9/20</a:t>
             </a:fld>
             <a:endParaRPr lang="en-US"/>
           </a:p>
@@ -2794,7 +2794,7 @@
           <a:p>
             <a:fld id="{54235F48-D939-424A-B563-AE881225AA62}" type="datetimeFigureOut">
               <a:rPr lang="en-US" smtClean="0"/>
-              <a:t>9/10/20</a:t>
+              <a:t>12/9/20</a:t>
             </a:fld>
             <a:endParaRPr lang="en-US"/>
           </a:p>
@@ -3007,7 +3007,7 @@
           <a:p>
             <a:fld id="{54235F48-D939-424A-B563-AE881225AA62}" type="datetimeFigureOut">
               <a:rPr lang="en-US" smtClean="0"/>
-              <a:t>9/10/20</a:t>
+              <a:t>12/9/20</a:t>
             </a:fld>
             <a:endParaRPr lang="en-US"/>
           </a:p>
@@ -4720,7 +4720,7 @@
                 </a:solidFill>
                 <a:ea typeface="Calibri" panose="020F0502020204030204" pitchFamily="34" charset="0"/>
                 <a:cs typeface="Times New Roman (Body CS)"/>
-                <a:hlinkClick r:id="rId7">
+                <a:hlinkClick r:id="rId6">
                   <a:extLst>
                     <a:ext uri="{A12FA001-AC4F-418D-AE19-62706E023703}">
                       <ahyp:hlinkClr xmlns:ahyp="http://schemas.microsoft.com/office/drawing/2018/hyperlinkcolor" val="tx"/>
@@ -5314,7 +5314,7 @@
                 </a:solidFill>
                 <a:ea typeface="Calibri" panose="020F0502020204030204" pitchFamily="34" charset="0"/>
                 <a:cs typeface="Times New Roman (Body CS)"/>
-                <a:hlinkClick r:id="rId7">
+                <a:hlinkClick r:id="rId6">
                   <a:extLst>
                     <a:ext uri="{A12FA001-AC4F-418D-AE19-62706E023703}">
                       <ahyp:hlinkClr xmlns:ahyp="http://schemas.microsoft.com/office/drawing/2018/hyperlinkcolor" val="tx"/>
@@ -5322,7 +5322,41 @@
                   </a:extLst>
                 </a:hlinkClick>
               </a:rPr>
-              <a:t>Best Practices FAQ</a:t>
+              <a:t>Best </a:t>
+            </a:r>
+            <a:r>
+              <a:rPr lang="en-US" b="1" cap="small" dirty="0">
+                <a:solidFill>
+                  <a:schemeClr val="bg1"/>
+                </a:solidFill>
+                <a:ea typeface="Calibri" panose="020F0502020204030204" pitchFamily="34" charset="0"/>
+                <a:cs typeface="Times New Roman (Body CS)"/>
+                <a:hlinkClick r:id="rId6">
+                  <a:extLst>
+                    <a:ext uri="{A12FA001-AC4F-418D-AE19-62706E023703}">
+                      <ahyp:hlinkClr xmlns:ahyp="http://schemas.microsoft.com/office/drawing/2018/hyperlinkcolor" val="tx"/>
+                    </a:ext>
+                  </a:extLst>
+                </a:hlinkClick>
+              </a:rPr>
+              <a:t>Practices</a:t>
+            </a:r>
+            <a:r>
+              <a:rPr lang="en-US" b="1" cap="small" dirty="0">
+                <a:solidFill>
+                  <a:schemeClr val="bg1"/>
+                </a:solidFill>
+                <a:ea typeface="Calibri" panose="020F0502020204030204" pitchFamily="34" charset="0"/>
+                <a:cs typeface="Times New Roman (Body CS)"/>
+                <a:hlinkClick r:id="rId6">
+                  <a:extLst>
+                    <a:ext uri="{A12FA001-AC4F-418D-AE19-62706E023703}">
+                      <ahyp:hlinkClr xmlns:ahyp="http://schemas.microsoft.com/office/drawing/2018/hyperlinkcolor" val="tx"/>
+                    </a:ext>
+                  </a:extLst>
+                </a:hlinkClick>
+              </a:rPr>
+              <a:t> FAQ</a:t>
             </a:r>
             <a:endParaRPr lang="en-US" dirty="0">
               <a:solidFill>
@@ -5412,12 +5446,25 @@
             <a:pPr algn="ctr"/>
             <a:r>
               <a:rPr lang="en-US" b="1" cap="small" dirty="0">
+                <a:solidFill>
+                  <a:schemeClr val="bg1"/>
+                </a:solidFill>
                 <a:ea typeface="Calibri" panose="020F0502020204030204" pitchFamily="34" charset="0"/>
                 <a:cs typeface="Times New Roman (Body CS)"/>
+                <a:hlinkClick r:id="rId7">
+                  <a:extLst>
+                    <a:ext uri="{A12FA001-AC4F-418D-AE19-62706E023703}">
+                      <ahyp:hlinkClr xmlns:ahyp="http://schemas.microsoft.com/office/drawing/2018/hyperlinkcolor" val="tx"/>
+                    </a:ext>
+                  </a:extLst>
+                </a:hlinkClick>
               </a:rPr>
               <a:t>Find Your Data</a:t>
             </a:r>
             <a:endParaRPr lang="en-US" dirty="0">
+              <a:solidFill>
+                <a:schemeClr val="bg1"/>
+              </a:solidFill>
               <a:ea typeface="Calibri" panose="020F0502020204030204" pitchFamily="34" charset="0"/>
               <a:cs typeface="Times New Roman" panose="02020603050405020304" pitchFamily="18" charset="0"/>
             </a:endParaRPr>
@@ -6184,7 +6231,7 @@
                 </a:solidFill>
                 <a:ea typeface="Calibri" panose="020F0502020204030204" pitchFamily="34" charset="0"/>
                 <a:cs typeface="Times New Roman (Body CS)"/>
-                <a:hlinkClick r:id="rId8">
+                <a:hlinkClick r:id="rId9">
                   <a:extLst>
                     <a:ext uri="{A12FA001-AC4F-418D-AE19-62706E023703}">
                       <ahyp:hlinkClr xmlns:ahyp="http://schemas.microsoft.com/office/drawing/2018/hyperlinkcolor" val="tx"/>
@@ -6291,6 +6338,13 @@
                 </a:solidFill>
                 <a:ea typeface="Calibri" panose="020F0502020204030204" pitchFamily="34" charset="0"/>
                 <a:cs typeface="Times New Roman (Body CS)"/>
+                <a:hlinkClick r:id="rId10">
+                  <a:extLst>
+                    <a:ext uri="{A12FA001-AC4F-418D-AE19-62706E023703}">
+                      <ahyp:hlinkClr xmlns:ahyp="http://schemas.microsoft.com/office/drawing/2018/hyperlinkcolor" val="tx"/>
+                    </a:ext>
+                  </a:extLst>
+                </a:hlinkClick>
               </a:rPr>
               <a:t>MRI Buddy Sign-Up</a:t>
             </a:r>
@@ -6307,7 +6361,7 @@
       <p:sp>
         <p:nvSpPr>
           <p:cNvPr id="54" name="Rounded Rectangle 53">
-            <a:hlinkClick r:id="rId9"/>
+            <a:hlinkClick r:id="rId11"/>
             <a:extLst>
               <a:ext uri="{FF2B5EF4-FFF2-40B4-BE49-F238E27FC236}">
                 <a16:creationId xmlns:a16="http://schemas.microsoft.com/office/drawing/2014/main" id="{8DF4BEE3-0C9E-844D-BBA5-7D15B696D91F}"/>
@@ -6392,7 +6446,7 @@
                 </a:solidFill>
                 <a:ea typeface="Calibri" panose="020F0502020204030204" pitchFamily="34" charset="0"/>
                 <a:cs typeface="Times New Roman (Body CS)"/>
-                <a:hlinkClick r:id="rId9">
+                <a:hlinkClick r:id="rId12">
                   <a:extLst>
                     <a:ext uri="{A12FA001-AC4F-418D-AE19-62706E023703}">
                       <ahyp:hlinkClr xmlns:ahyp="http://schemas.microsoft.com/office/drawing/2018/hyperlinkcolor" val="tx"/>
@@ -6415,7 +6469,7 @@
       <p:sp>
         <p:nvSpPr>
           <p:cNvPr id="57" name="Rounded Rectangle 56">
-            <a:hlinkClick r:id="rId10"/>
+            <a:hlinkClick r:id="rId13"/>
             <a:extLst>
               <a:ext uri="{FF2B5EF4-FFF2-40B4-BE49-F238E27FC236}">
                 <a16:creationId xmlns:a16="http://schemas.microsoft.com/office/drawing/2014/main" id="{130B27E3-54A0-F444-856F-95E54674E36B}"/>
@@ -6496,7 +6550,7 @@
                 </a:solidFill>
                 <a:ea typeface="Calibri" panose="020F0502020204030204" pitchFamily="34" charset="0"/>
                 <a:cs typeface="Times New Roman (Body CS)"/>
-                <a:hlinkClick r:id="rId10">
+                <a:hlinkClick r:id="rId14">
                   <a:extLst>
                     <a:ext uri="{A12FA001-AC4F-418D-AE19-62706E023703}">
                       <ahyp:hlinkClr xmlns:ahyp="http://schemas.microsoft.com/office/drawing/2018/hyperlinkcolor" val="tx"/>
@@ -6504,7 +6558,7 @@
                   </a:extLst>
                 </a:hlinkClick>
               </a:rPr>
-              <a:t>Acquisition</a:t>
+              <a:t>Acquisition Parameters</a:t>
             </a:r>
             <a:endParaRPr lang="en-US" dirty="0">
               <a:solidFill>
@@ -6519,7 +6573,7 @@
       <p:sp>
         <p:nvSpPr>
           <p:cNvPr id="58" name="Rounded Rectangle 57">
-            <a:hlinkClick r:id="rId11"/>
+            <a:hlinkClick r:id="rId15"/>
             <a:extLst>
               <a:ext uri="{FF2B5EF4-FFF2-40B4-BE49-F238E27FC236}">
                 <a16:creationId xmlns:a16="http://schemas.microsoft.com/office/drawing/2014/main" id="{98DBCBB0-7F93-D248-ABE4-670F9CE80FD3}"/>
@@ -6604,7 +6658,7 @@
                 </a:solidFill>
                 <a:ea typeface="Calibri" panose="020F0502020204030204" pitchFamily="34" charset="0"/>
                 <a:cs typeface="Times New Roman (Body CS)"/>
-                <a:hlinkClick r:id="rId11">
+                <a:hlinkClick r:id="rId16">
                   <a:extLst>
                     <a:ext uri="{A12FA001-AC4F-418D-AE19-62706E023703}">
                       <ahyp:hlinkClr xmlns:ahyp="http://schemas.microsoft.com/office/drawing/2018/hyperlinkcolor" val="tx"/>
@@ -6612,24 +6666,7 @@
                   </a:extLst>
                 </a:hlinkClick>
               </a:rPr>
-              <a:t>Program</a:t>
-            </a:r>
-            <a:r>
-              <a:rPr lang="en-US" b="1" cap="small" dirty="0">
-                <a:solidFill>
-                  <a:schemeClr val="bg1"/>
-                </a:solidFill>
-                <a:ea typeface="Calibri" panose="020F0502020204030204" pitchFamily="34" charset="0"/>
-                <a:cs typeface="Times New Roman (Body CS)"/>
-                <a:hlinkClick r:id="rId11">
-                  <a:extLst>
-                    <a:ext uri="{A12FA001-AC4F-418D-AE19-62706E023703}">
-                      <ahyp:hlinkClr xmlns:ahyp="http://schemas.microsoft.com/office/drawing/2018/hyperlinkcolor" val="tx"/>
-                    </a:ext>
-                  </a:extLst>
-                </a:hlinkClick>
-              </a:rPr>
-              <a:t> Card Setup using Reproin</a:t>
+              <a:t>Program Card Setup using Reproin</a:t>
             </a:r>
             <a:endParaRPr lang="en-US" dirty="0">
               <a:solidFill>
@@ -6644,7 +6681,7 @@
       <p:sp>
         <p:nvSpPr>
           <p:cNvPr id="63" name="Rounded Rectangle 62">
-            <a:hlinkClick r:id="rId12"/>
+            <a:hlinkClick r:id="rId17"/>
             <a:extLst>
               <a:ext uri="{FF2B5EF4-FFF2-40B4-BE49-F238E27FC236}">
                 <a16:creationId xmlns:a16="http://schemas.microsoft.com/office/drawing/2014/main" id="{4382A558-D8EB-D14F-9884-259A47BF19F7}"/>
@@ -6725,7 +6762,7 @@
                 </a:solidFill>
                 <a:ea typeface="Calibri" panose="020F0502020204030204" pitchFamily="34" charset="0"/>
                 <a:cs typeface="Times New Roman (Body CS)"/>
-                <a:hlinkClick r:id="rId12">
+                <a:hlinkClick r:id="rId17">
                   <a:extLst>
                     <a:ext uri="{A12FA001-AC4F-418D-AE19-62706E023703}">
                       <ahyp:hlinkClr xmlns:ahyp="http://schemas.microsoft.com/office/drawing/2018/hyperlinkcolor" val="tx"/>
@@ -6891,7 +6928,7 @@
       <p:sp>
         <p:nvSpPr>
           <p:cNvPr id="66" name="Rounded Rectangle 65">
-            <a:hlinkClick r:id="rId13"/>
+            <a:hlinkClick r:id="rId18"/>
             <a:extLst>
               <a:ext uri="{FF2B5EF4-FFF2-40B4-BE49-F238E27FC236}">
                 <a16:creationId xmlns:a16="http://schemas.microsoft.com/office/drawing/2014/main" id="{23EA373B-A672-8D46-B9D2-FEFBFBF10314}"/>
@@ -6970,7 +7007,7 @@
                 </a:solidFill>
                 <a:ea typeface="Calibri" panose="020F0502020204030204" pitchFamily="34" charset="0"/>
                 <a:cs typeface="Times New Roman" panose="02020603050405020304" pitchFamily="18" charset="0"/>
-                <a:hlinkClick r:id="rId14">
+                <a:hlinkClick r:id="rId19">
                   <a:extLst>
                     <a:ext uri="{A12FA001-AC4F-418D-AE19-62706E023703}">
                       <ahyp:hlinkClr xmlns:ahyp="http://schemas.microsoft.com/office/drawing/2018/hyperlinkcolor" val="tx"/>
@@ -6993,7 +7030,7 @@
       <p:sp>
         <p:nvSpPr>
           <p:cNvPr id="67" name="Rounded Rectangle 66">
-            <a:hlinkClick r:id="rId15"/>
+            <a:hlinkClick r:id="rId20"/>
             <a:extLst>
               <a:ext uri="{FF2B5EF4-FFF2-40B4-BE49-F238E27FC236}">
                 <a16:creationId xmlns:a16="http://schemas.microsoft.com/office/drawing/2014/main" id="{B3FB1FE2-96B9-1E40-8274-A017814B3DD9}"/>
@@ -7072,7 +7109,7 @@
                 </a:solidFill>
                 <a:ea typeface="Calibri" panose="020F0502020204030204" pitchFamily="34" charset="0"/>
                 <a:cs typeface="Times New Roman" panose="02020603050405020304" pitchFamily="18" charset="0"/>
-                <a:hlinkClick r:id="rId15">
+                <a:hlinkClick r:id="rId21">
                   <a:extLst>
                     <a:ext uri="{A12FA001-AC4F-418D-AE19-62706E023703}">
                       <ahyp:hlinkClr xmlns:ahyp="http://schemas.microsoft.com/office/drawing/2018/hyperlinkcolor" val="tx"/>
@@ -7176,7 +7213,7 @@
       <p:sp>
         <p:nvSpPr>
           <p:cNvPr id="69" name="Rounded Rectangle 68">
-            <a:hlinkClick r:id="rId16"/>
+            <a:hlinkClick r:id="rId22"/>
             <a:extLst>
               <a:ext uri="{FF2B5EF4-FFF2-40B4-BE49-F238E27FC236}">
                 <a16:creationId xmlns:a16="http://schemas.microsoft.com/office/drawing/2014/main" id="{FAC11A01-3E34-5544-9C85-62B46194F0FA}"/>
@@ -7255,7 +7292,7 @@
                 </a:solidFill>
                 <a:ea typeface="Calibri" panose="020F0502020204030204" pitchFamily="34" charset="0"/>
                 <a:cs typeface="Times New Roman" panose="02020603050405020304" pitchFamily="18" charset="0"/>
-                <a:hlinkClick r:id="rId16">
+                <a:hlinkClick r:id="rId23">
                   <a:extLst>
                     <a:ext uri="{A12FA001-AC4F-418D-AE19-62706E023703}">
                       <ahyp:hlinkClr xmlns:ahyp="http://schemas.microsoft.com/office/drawing/2018/hyperlinkcolor" val="tx"/>
@@ -7278,7 +7315,7 @@
       <p:sp>
         <p:nvSpPr>
           <p:cNvPr id="70" name="Rounded Rectangle 69">
-            <a:hlinkClick r:id="rId17"/>
+            <a:hlinkClick r:id="rId24"/>
             <a:extLst>
               <a:ext uri="{FF2B5EF4-FFF2-40B4-BE49-F238E27FC236}">
                 <a16:creationId xmlns:a16="http://schemas.microsoft.com/office/drawing/2014/main" id="{5C38F2D3-6237-DA43-AC12-2BEBD8215185}"/>
@@ -7357,7 +7394,7 @@
                 </a:solidFill>
                 <a:ea typeface="Calibri" panose="020F0502020204030204" pitchFamily="34" charset="0"/>
                 <a:cs typeface="Times New Roman" panose="02020603050405020304" pitchFamily="18" charset="0"/>
-                <a:hlinkClick r:id="rId17">
+                <a:hlinkClick r:id="rId25">
                   <a:extLst>
                     <a:ext uri="{A12FA001-AC4F-418D-AE19-62706E023703}">
                       <ahyp:hlinkClr xmlns:ahyp="http://schemas.microsoft.com/office/drawing/2018/hyperlinkcolor" val="tx"/>
@@ -7380,7 +7417,7 @@
       <p:sp>
         <p:nvSpPr>
           <p:cNvPr id="71" name="Rounded Rectangle 70">
-            <a:hlinkClick r:id="rId18"/>
+            <a:hlinkClick r:id="rId26"/>
             <a:extLst>
               <a:ext uri="{FF2B5EF4-FFF2-40B4-BE49-F238E27FC236}">
                 <a16:creationId xmlns:a16="http://schemas.microsoft.com/office/drawing/2014/main" id="{FEB7B85A-DEFF-D94C-90D6-ABC39142A66B}"/>
@@ -7459,7 +7496,7 @@
                 </a:solidFill>
                 <a:ea typeface="Calibri" panose="020F0502020204030204" pitchFamily="34" charset="0"/>
                 <a:cs typeface="Times New Roman" panose="02020603050405020304" pitchFamily="18" charset="0"/>
-                <a:hlinkClick r:id="rId18">
+                <a:hlinkClick r:id="rId27">
                   <a:extLst>
                     <a:ext uri="{A12FA001-AC4F-418D-AE19-62706E023703}">
                       <ahyp:hlinkClr xmlns:ahyp="http://schemas.microsoft.com/office/drawing/2018/hyperlinkcolor" val="tx"/>
@@ -7686,7 +7723,7 @@
       <p:sp>
         <p:nvSpPr>
           <p:cNvPr id="93" name="Rounded Rectangle 92">
-            <a:hlinkClick r:id="rId19"/>
+            <a:hlinkClick r:id="rId28"/>
             <a:extLst>
               <a:ext uri="{FF2B5EF4-FFF2-40B4-BE49-F238E27FC236}">
                 <a16:creationId xmlns:a16="http://schemas.microsoft.com/office/drawing/2014/main" id="{827F4B31-7E46-224A-8922-B86E87040F91}"/>
@@ -7765,7 +7802,7 @@
                 </a:solidFill>
                 <a:ea typeface="Calibri" panose="020F0502020204030204" pitchFamily="34" charset="0"/>
                 <a:cs typeface="Times New Roman" panose="02020603050405020304" pitchFamily="18" charset="0"/>
-                <a:hlinkClick r:id="rId19">
+                <a:hlinkClick r:id="rId29">
                   <a:extLst>
                     <a:ext uri="{A12FA001-AC4F-418D-AE19-62706E023703}">
                       <ahyp:hlinkClr xmlns:ahyp="http://schemas.microsoft.com/office/drawing/2018/hyperlinkcolor" val="tx"/>
@@ -7773,41 +7810,7 @@
                   </a:extLst>
                 </a:hlinkClick>
               </a:rPr>
-              <a:t>Run MRIQC (</a:t>
-            </a:r>
-            <a:r>
-              <a:rPr lang="en-US" b="1" cap="small" dirty="0" err="1">
-                <a:solidFill>
-                  <a:schemeClr val="bg1"/>
-                </a:solidFill>
-                <a:ea typeface="Calibri" panose="020F0502020204030204" pitchFamily="34" charset="0"/>
-                <a:cs typeface="Times New Roman" panose="02020603050405020304" pitchFamily="18" charset="0"/>
-                <a:hlinkClick r:id="rId19">
-                  <a:extLst>
-                    <a:ext uri="{A12FA001-AC4F-418D-AE19-62706E023703}">
-                      <ahyp:hlinkClr xmlns:ahyp="http://schemas.microsoft.com/office/drawing/2018/hyperlinkcolor" val="tx"/>
-                    </a:ext>
-                  </a:extLst>
-                </a:hlinkClick>
-              </a:rPr>
-              <a:t>run_mriqc.sh</a:t>
-            </a:r>
-            <a:r>
-              <a:rPr lang="en-US" b="1" cap="small" dirty="0">
-                <a:solidFill>
-                  <a:schemeClr val="bg1"/>
-                </a:solidFill>
-                <a:ea typeface="Calibri" panose="020F0502020204030204" pitchFamily="34" charset="0"/>
-                <a:cs typeface="Times New Roman" panose="02020603050405020304" pitchFamily="18" charset="0"/>
-                <a:hlinkClick r:id="rId19">
-                  <a:extLst>
-                    <a:ext uri="{A12FA001-AC4F-418D-AE19-62706E023703}">
-                      <ahyp:hlinkClr xmlns:ahyp="http://schemas.microsoft.com/office/drawing/2018/hyperlinkcolor" val="tx"/>
-                    </a:ext>
-                  </a:extLst>
-                </a:hlinkClick>
-              </a:rPr>
-              <a:t>)</a:t>
+              <a:t>Run MRIQC (run_mriqc.sh)</a:t>
             </a:r>
             <a:endParaRPr lang="en-US" dirty="0">
               <a:solidFill>
@@ -8030,7 +8033,7 @@
       <p:sp>
         <p:nvSpPr>
           <p:cNvPr id="98" name="Rounded Rectangle 97">
-            <a:hlinkClick r:id="rId20"/>
+            <a:hlinkClick r:id="rId30"/>
             <a:extLst>
               <a:ext uri="{FF2B5EF4-FFF2-40B4-BE49-F238E27FC236}">
                 <a16:creationId xmlns:a16="http://schemas.microsoft.com/office/drawing/2014/main" id="{0D6F03FA-B07D-D347-B952-71B5378F3242}"/>
@@ -8109,7 +8112,7 @@
                 </a:solidFill>
                 <a:ea typeface="Calibri" panose="020F0502020204030204" pitchFamily="34" charset="0"/>
                 <a:cs typeface="Times New Roman" panose="02020603050405020304" pitchFamily="18" charset="0"/>
-                <a:hlinkClick r:id="rId20">
+                <a:hlinkClick r:id="rId31">
                   <a:extLst>
                     <a:ext uri="{A12FA001-AC4F-418D-AE19-62706E023703}">
                       <ahyp:hlinkClr xmlns:ahyp="http://schemas.microsoft.com/office/drawing/2018/hyperlinkcolor" val="tx"/>
@@ -8129,7 +8132,7 @@
                 </a:solidFill>
                 <a:ea typeface="Calibri" panose="020F0502020204030204" pitchFamily="34" charset="0"/>
                 <a:cs typeface="Times New Roman" panose="02020603050405020304" pitchFamily="18" charset="0"/>
-                <a:hlinkClick r:id="rId20">
+                <a:hlinkClick r:id="rId31">
                   <a:extLst>
                     <a:ext uri="{A12FA001-AC4F-418D-AE19-62706E023703}">
                       <ahyp:hlinkClr xmlns:ahyp="http://schemas.microsoft.com/office/drawing/2018/hyperlinkcolor" val="tx"/>
@@ -8146,7 +8149,7 @@
                 </a:solidFill>
                 <a:ea typeface="Calibri" panose="020F0502020204030204" pitchFamily="34" charset="0"/>
                 <a:cs typeface="Times New Roman" panose="02020603050405020304" pitchFamily="18" charset="0"/>
-                <a:hlinkClick r:id="rId20">
+                <a:hlinkClick r:id="rId31">
                   <a:extLst>
                     <a:ext uri="{A12FA001-AC4F-418D-AE19-62706E023703}">
                       <ahyp:hlinkClr xmlns:ahyp="http://schemas.microsoft.com/office/drawing/2018/hyperlinkcolor" val="tx"/>
@@ -8163,7 +8166,7 @@
                 </a:solidFill>
                 <a:ea typeface="Calibri" panose="020F0502020204030204" pitchFamily="34" charset="0"/>
                 <a:cs typeface="Times New Roman" panose="02020603050405020304" pitchFamily="18" charset="0"/>
-                <a:hlinkClick r:id="rId20">
+                <a:hlinkClick r:id="rId31">
                   <a:extLst>
                     <a:ext uri="{A12FA001-AC4F-418D-AE19-62706E023703}">
                       <ahyp:hlinkClr xmlns:ahyp="http://schemas.microsoft.com/office/drawing/2018/hyperlinkcolor" val="tx"/>
@@ -8765,7 +8768,7 @@
       <p:sp>
         <p:nvSpPr>
           <p:cNvPr id="128" name="Rounded Rectangle 127">
-            <a:hlinkClick r:id="rId21"/>
+            <a:hlinkClick r:id="rId32"/>
             <a:extLst>
               <a:ext uri="{FF2B5EF4-FFF2-40B4-BE49-F238E27FC236}">
                 <a16:creationId xmlns:a16="http://schemas.microsoft.com/office/drawing/2014/main" id="{90D1B34F-24C9-6B40-9680-06F8F7ADCD3E}"/>
@@ -8853,7 +8856,7 @@
                 </a:solidFill>
                 <a:ea typeface="Calibri" panose="020F0502020204030204" pitchFamily="34" charset="0"/>
                 <a:cs typeface="Times New Roman" panose="02020603050405020304" pitchFamily="18" charset="0"/>
-                <a:hlinkClick r:id="rId21">
+                <a:hlinkClick r:id="rId33">
                   <a:extLst>
                     <a:ext uri="{A12FA001-AC4F-418D-AE19-62706E023703}">
                       <ahyp:hlinkClr xmlns:ahyp="http://schemas.microsoft.com/office/drawing/2018/hyperlinkcolor" val="tx"/>
@@ -9069,7 +9072,7 @@
       <p:sp>
         <p:nvSpPr>
           <p:cNvPr id="101" name="Rounded Rectangle 100">
-            <a:hlinkClick r:id="rId22"/>
+            <a:hlinkClick r:id="rId34"/>
             <a:extLst>
               <a:ext uri="{FF2B5EF4-FFF2-40B4-BE49-F238E27FC236}">
                 <a16:creationId xmlns:a16="http://schemas.microsoft.com/office/drawing/2014/main" id="{277F05A2-578E-CE44-8D16-1C9B8390C4BE}"/>
@@ -9161,7 +9164,7 @@
                 </a:solidFill>
                 <a:ea typeface="Calibri" panose="020F0502020204030204" pitchFamily="34" charset="0"/>
                 <a:cs typeface="Times New Roman (Body CS)"/>
-                <a:hlinkClick r:id="rId22">
+                <a:hlinkClick r:id="rId34">
                   <a:extLst>
                     <a:ext uri="{A12FA001-AC4F-418D-AE19-62706E023703}">
                       <ahyp:hlinkClr xmlns:ahyp="http://schemas.microsoft.com/office/drawing/2018/hyperlinkcolor" val="tx"/>
@@ -9515,7 +9518,7 @@
       <p:sp>
         <p:nvSpPr>
           <p:cNvPr id="107" name="Rounded Rectangle 106">
-            <a:hlinkClick r:id="rId23"/>
+            <a:hlinkClick r:id="rId35"/>
             <a:extLst>
               <a:ext uri="{FF2B5EF4-FFF2-40B4-BE49-F238E27FC236}">
                 <a16:creationId xmlns:a16="http://schemas.microsoft.com/office/drawing/2014/main" id="{F710C858-9445-4047-B0DE-9E858A01422E}"/>
@@ -9607,7 +9610,7 @@
                 </a:solidFill>
                 <a:ea typeface="Calibri" panose="020F0502020204030204" pitchFamily="34" charset="0"/>
                 <a:cs typeface="Times New Roman (Body CS)"/>
-                <a:hlinkClick r:id="rId23">
+                <a:hlinkClick r:id="rId35">
                   <a:extLst>
                     <a:ext uri="{A12FA001-AC4F-418D-AE19-62706E023703}">
                       <ahyp:hlinkClr xmlns:ahyp="http://schemas.microsoft.com/office/drawing/2018/hyperlinkcolor" val="tx"/>
@@ -10308,7 +10311,7 @@
       <p:sp>
         <p:nvSpPr>
           <p:cNvPr id="122" name="Rounded Rectangle 121">
-            <a:hlinkClick r:id="rId24"/>
+            <a:hlinkClick r:id="rId36"/>
             <a:extLst>
               <a:ext uri="{FF2B5EF4-FFF2-40B4-BE49-F238E27FC236}">
                 <a16:creationId xmlns:a16="http://schemas.microsoft.com/office/drawing/2014/main" id="{28C89159-3DB5-DB49-B242-85F3F62376C9}"/>
@@ -10396,7 +10399,7 @@
                 </a:solidFill>
                 <a:ea typeface="Calibri" panose="020F0502020204030204" pitchFamily="34" charset="0"/>
                 <a:cs typeface="Times New Roman (Body CS)"/>
-                <a:hlinkClick r:id="rId24">
+                <a:hlinkClick r:id="rId36">
                   <a:extLst>
                     <a:ext uri="{A12FA001-AC4F-418D-AE19-62706E023703}">
                       <ahyp:hlinkClr xmlns:ahyp="http://schemas.microsoft.com/office/drawing/2018/hyperlinkcolor" val="tx"/>
@@ -10522,7 +10525,7 @@
       <p:sp>
         <p:nvSpPr>
           <p:cNvPr id="124" name="Rounded Rectangle 123">
-            <a:hlinkClick r:id="rId25"/>
+            <a:hlinkClick r:id="rId37"/>
             <a:extLst>
               <a:ext uri="{FF2B5EF4-FFF2-40B4-BE49-F238E27FC236}">
                 <a16:creationId xmlns:a16="http://schemas.microsoft.com/office/drawing/2014/main" id="{352B44AF-C2EE-9B41-894A-E04DC4439C6C}"/>
@@ -10610,7 +10613,7 @@
                 </a:solidFill>
                 <a:ea typeface="Calibri" panose="020F0502020204030204" pitchFamily="34" charset="0"/>
                 <a:cs typeface="Times New Roman (Body CS)"/>
-                <a:hlinkClick r:id="rId25">
+                <a:hlinkClick r:id="rId37">
                   <a:extLst>
                     <a:ext uri="{A12FA001-AC4F-418D-AE19-62706E023703}">
                       <ahyp:hlinkClr xmlns:ahyp="http://schemas.microsoft.com/office/drawing/2018/hyperlinkcolor" val="tx"/>
@@ -10837,7 +10840,7 @@
       <p:sp>
         <p:nvSpPr>
           <p:cNvPr id="134" name="Rounded Rectangle 133">
-            <a:hlinkClick r:id="rId26"/>
+            <a:hlinkClick r:id="rId38"/>
             <a:extLst>
               <a:ext uri="{FF2B5EF4-FFF2-40B4-BE49-F238E27FC236}">
                 <a16:creationId xmlns:a16="http://schemas.microsoft.com/office/drawing/2014/main" id="{45281CA5-E4A1-2A4F-83DF-275D386BBA79}"/>
@@ -10925,7 +10928,7 @@
                 </a:solidFill>
                 <a:ea typeface="Calibri" panose="020F0502020204030204" pitchFamily="34" charset="0"/>
                 <a:cs typeface="Times New Roman (Body CS)"/>
-                <a:hlinkClick r:id="rId26">
+                <a:hlinkClick r:id="rId38">
                   <a:extLst>
                     <a:ext uri="{A12FA001-AC4F-418D-AE19-62706E023703}">
                       <ahyp:hlinkClr xmlns:ahyp="http://schemas.microsoft.com/office/drawing/2018/hyperlinkcolor" val="tx"/>
@@ -10945,7 +10948,7 @@
                 </a:solidFill>
                 <a:ea typeface="Calibri" panose="020F0502020204030204" pitchFamily="34" charset="0"/>
                 <a:cs typeface="Times New Roman" panose="02020603050405020304" pitchFamily="18" charset="0"/>
-                <a:hlinkClick r:id="rId26">
+                <a:hlinkClick r:id="rId38">
                   <a:extLst>
                     <a:ext uri="{A12FA001-AC4F-418D-AE19-62706E023703}">
                       <ahyp:hlinkClr xmlns:ahyp="http://schemas.microsoft.com/office/drawing/2018/hyperlinkcolor" val="tx"/>
@@ -12136,11 +12139,11 @@
             <p:nvPr/>
           </p:nvPicPr>
           <p:blipFill>
-            <a:blip r:embed="rId27">
+            <a:blip r:embed="rId39">
               <a:extLst>
                 <a:ext uri="{BEBA8EAE-BF5A-486C-A8C5-ECC9F3942E4B}">
                   <a14:imgProps xmlns:a14="http://schemas.microsoft.com/office/drawing/2010/main">
-                    <a14:imgLayer r:embed="rId28">
+                    <a14:imgLayer r:embed="rId40">
                       <a14:imgEffect>
                         <a14:backgroundRemoval t="1535" b="97187" l="2821" r="98462">
                           <a14:foregroundMark x1="23333" y1="65985" x2="25641" y2="27877"/>
@@ -12441,7 +12444,7 @@
       <p:sp>
         <p:nvSpPr>
           <p:cNvPr id="131" name="Rounded Rectangle 130">
-            <a:hlinkClick r:id="rId13"/>
+            <a:hlinkClick r:id="rId18"/>
             <a:extLst>
               <a:ext uri="{FF2B5EF4-FFF2-40B4-BE49-F238E27FC236}">
                 <a16:creationId xmlns:a16="http://schemas.microsoft.com/office/drawing/2014/main" id="{F22257EC-C010-BA46-9AE4-51D5BE870236}"/>
@@ -12520,7 +12523,7 @@
                 </a:solidFill>
                 <a:ea typeface="Calibri" panose="020F0502020204030204" pitchFamily="34" charset="0"/>
                 <a:cs typeface="Times New Roman" panose="02020603050405020304" pitchFamily="18" charset="0"/>
-                <a:hlinkClick r:id="rId29">
+                <a:hlinkClick r:id="rId41">
                   <a:extLst>
                     <a:ext uri="{A12FA001-AC4F-418D-AE19-62706E023703}">
                       <ahyp:hlinkClr xmlns:ahyp="http://schemas.microsoft.com/office/drawing/2018/hyperlinkcolor" val="tx"/>

</xml_diff>